<commit_message>
added sfb version of figure; included in slides
</commit_message>
<xml_diff>
--- a/slides/sfb-slides.pptx
+++ b/slides/sfb-slides.pptx
@@ -10628,6 +10628,13 @@
   <p:clrMapOvr>
     <a:masterClrMapping/>
   </p:clrMapOvr>
+  <p:timing>
+    <p:tnLst>
+      <p:par>
+        <p:cTn id="1" dur="indefinite" restart="never" nodeType="tmRoot"/>
+      </p:par>
+    </p:tnLst>
+  </p:timing>
 </p:sld>
 </file>
 
@@ -10729,8 +10736,8 @@
           <a:lstStyle/>
           <a:p>
             <a:r>
-              <a:rPr lang="en-US" dirty="0" smtClean="0"/>
-              <a:t>Highlights</a:t>
+              <a:rPr lang="en-US" smtClean="0"/>
+              <a:t>Demo workflow</a:t>
             </a:r>
             <a:endParaRPr lang="en-US" dirty="0"/>
           </a:p>
@@ -10764,6 +10771,36 @@
           </a:p>
         </p:txBody>
       </p:sp>
+      <p:pic>
+        <p:nvPicPr>
+          <p:cNvPr id="6" name="Picture 5"/>
+          <p:cNvPicPr>
+            <a:picLocks noChangeAspect="1"/>
+          </p:cNvPicPr>
+          <p:nvPr/>
+        </p:nvPicPr>
+        <p:blipFill>
+          <a:blip r:embed="rId2" cstate="print">
+            <a:extLst>
+              <a:ext uri="{28A0092B-C50C-407E-A947-70E740481C1C}">
+                <a14:useLocalDpi xmlns:a14="http://schemas.microsoft.com/office/drawing/2010/main" val="0"/>
+              </a:ext>
+            </a:extLst>
+          </a:blip>
+          <a:stretch>
+            <a:fillRect/>
+          </a:stretch>
+        </p:blipFill>
+        <p:spPr>
+          <a:xfrm>
+            <a:off x="741450" y="3429000"/>
+            <a:ext cx="8409000" cy="2642579"/>
+          </a:xfrm>
+          <a:prstGeom prst="rect">
+            <a:avLst/>
+          </a:prstGeom>
+        </p:spPr>
+      </p:pic>
     </p:spTree>
     <p:extLst>
       <p:ext uri="{BB962C8B-B14F-4D97-AF65-F5344CB8AC3E}">
@@ -10774,6 +10811,13 @@
   <p:clrMapOvr>
     <a:masterClrMapping/>
   </p:clrMapOvr>
+  <p:timing>
+    <p:tnLst>
+      <p:par>
+        <p:cTn id="1" dur="indefinite" restart="never" nodeType="tmRoot"/>
+      </p:par>
+    </p:tnLst>
+  </p:timing>
 </p:sld>
 </file>
 
@@ -10912,6 +10956,13 @@
   <p:clrMapOvr>
     <a:masterClrMapping/>
   </p:clrMapOvr>
+  <p:timing>
+    <p:tnLst>
+      <p:par>
+        <p:cTn id="1" dur="indefinite" restart="never" nodeType="tmRoot"/>
+      </p:par>
+    </p:tnLst>
+  </p:timing>
 </p:sld>
 </file>
 
@@ -10984,6 +11035,13 @@
   <p:clrMapOvr>
     <a:masterClrMapping/>
   </p:clrMapOvr>
+  <p:timing>
+    <p:tnLst>
+      <p:par>
+        <p:cTn id="1" dur="indefinite" restart="never" nodeType="tmRoot"/>
+      </p:par>
+    </p:tnLst>
+  </p:timing>
 </p:sld>
 </file>
 
@@ -11056,6 +11114,13 @@
   <p:clrMapOvr>
     <a:masterClrMapping/>
   </p:clrMapOvr>
+  <p:timing>
+    <p:tnLst>
+      <p:par>
+        <p:cTn id="1" dur="indefinite" restart="never" nodeType="tmRoot"/>
+      </p:par>
+    </p:tnLst>
+  </p:timing>
 </p:sld>
 </file>
 
@@ -11128,6 +11193,13 @@
   <p:clrMapOvr>
     <a:masterClrMapping/>
   </p:clrMapOvr>
+  <p:timing>
+    <p:tnLst>
+      <p:par>
+        <p:cTn id="1" dur="indefinite" restart="never" nodeType="tmRoot"/>
+      </p:par>
+    </p:tnLst>
+  </p:timing>
 </p:sld>
 </file>
 
@@ -11200,6 +11272,13 @@
   <p:clrMapOvr>
     <a:masterClrMapping/>
   </p:clrMapOvr>
+  <p:timing>
+    <p:tnLst>
+      <p:par>
+        <p:cTn id="1" dur="indefinite" restart="never" nodeType="tmRoot"/>
+      </p:par>
+    </p:tnLst>
+  </p:timing>
 </p:sld>
 </file>
 
@@ -11272,6 +11351,13 @@
   <p:clrMapOvr>
     <a:masterClrMapping/>
   </p:clrMapOvr>
+  <p:timing>
+    <p:tnLst>
+      <p:par>
+        <p:cTn id="1" dur="indefinite" restart="never" nodeType="tmRoot"/>
+      </p:par>
+    </p:tnLst>
+  </p:timing>
 </p:sld>
 </file>
 
@@ -11330,6 +11416,13 @@
   <p:clrMapOvr>
     <a:masterClrMapping/>
   </p:clrMapOvr>
+  <p:timing>
+    <p:tnLst>
+      <p:par>
+        <p:cTn id="1" dur="indefinite" restart="never" nodeType="tmRoot"/>
+      </p:par>
+    </p:tnLst>
+  </p:timing>
 </p:sld>
 </file>
 

</xml_diff>

<commit_message>
Updated slides for video
Signed-off-by: peusterm <manuel.peuster@uni-paderborn.de>
</commit_message>
<xml_diff>
--- a/slides/sfb-slides.pptx
+++ b/slides/sfb-slides.pptx
@@ -311,7 +311,7 @@
               <a:pPr>
                 <a:defRPr/>
               </a:pPr>
-              <a:t>12.02.2019</a:t>
+              <a:t>14.02.19</a:t>
             </a:fld>
             <a:endParaRPr lang="de-DE"/>
           </a:p>
@@ -527,7 +527,7 @@
               <a:pPr>
                 <a:defRPr/>
               </a:pPr>
-              <a:t>12.02.2019</a:t>
+              <a:t>14.02.19</a:t>
             </a:fld>
             <a:endParaRPr lang="de-DE"/>
           </a:p>
@@ -594,38 +594,37 @@
           <a:p>
             <a:pPr lvl="0"/>
             <a:r>
-              <a:rPr lang="de-DE" noProof="0" smtClean="0"/>
+              <a:rPr lang="de-DE" noProof="0"/>
               <a:t>Textmasterformate durch Klicken bearbeiten</a:t>
             </a:r>
           </a:p>
           <a:p>
             <a:pPr lvl="1"/>
             <a:r>
-              <a:rPr lang="de-DE" noProof="0" smtClean="0"/>
+              <a:rPr lang="de-DE" noProof="0"/>
               <a:t>Zweite Ebene</a:t>
             </a:r>
           </a:p>
           <a:p>
             <a:pPr lvl="2"/>
             <a:r>
-              <a:rPr lang="de-DE" noProof="0" smtClean="0"/>
+              <a:rPr lang="de-DE" noProof="0"/>
               <a:t>Dritte Ebene</a:t>
             </a:r>
           </a:p>
           <a:p>
             <a:pPr lvl="3"/>
             <a:r>
-              <a:rPr lang="de-DE" noProof="0" smtClean="0"/>
+              <a:rPr lang="de-DE" noProof="0"/>
               <a:t>Vierte Ebene</a:t>
             </a:r>
           </a:p>
           <a:p>
             <a:pPr lvl="4"/>
             <a:r>
-              <a:rPr lang="de-DE" noProof="0" smtClean="0"/>
+              <a:rPr lang="de-DE" noProof="0"/>
               <a:t>Fünfte Ebene</a:t>
             </a:r>
-            <a:endParaRPr lang="de-DE" noProof="0"/>
           </a:p>
         </p:txBody>
       </p:sp>
@@ -940,10 +939,9 @@
               </a:spcBef>
             </a:pPr>
             <a:r>
-              <a:rPr lang="en-GB" smtClean="0"/>
+              <a:rPr lang="en-GB"/>
               <a:t>C4: On-the-fly Compute Center II</a:t>
             </a:r>
-            <a:endParaRPr lang="en-GB"/>
           </a:p>
         </p:txBody>
       </p:sp>
@@ -957,13 +955,6 @@
   <p:clrMapOvr>
     <a:masterClrMapping/>
   </p:clrMapOvr>
-  <p:timing>
-    <p:tnLst>
-      <p:par>
-        <p:cTn id="1" dur="indefinite" restart="never" nodeType="tmRoot"/>
-      </p:par>
-    </p:tnLst>
-  </p:timing>
 </p:sldLayout>
 </file>
 
@@ -1077,35 +1068,35 @@
           <a:p>
             <a:pPr lvl="0"/>
             <a:r>
-              <a:rPr lang="de-DE" smtClean="0"/>
+              <a:rPr lang="de-DE"/>
               <a:t>Textmasterformat bearbeiten</a:t>
             </a:r>
           </a:p>
           <a:p>
             <a:pPr lvl="1"/>
             <a:r>
-              <a:rPr lang="de-DE" smtClean="0"/>
+              <a:rPr lang="de-DE"/>
               <a:t>Zweite Ebene</a:t>
             </a:r>
           </a:p>
           <a:p>
             <a:pPr lvl="2"/>
             <a:r>
-              <a:rPr lang="de-DE" smtClean="0"/>
+              <a:rPr lang="de-DE"/>
               <a:t>Dritte Ebene</a:t>
             </a:r>
           </a:p>
           <a:p>
             <a:pPr lvl="3"/>
             <a:r>
-              <a:rPr lang="de-DE" smtClean="0"/>
+              <a:rPr lang="de-DE"/>
               <a:t>Vierte Ebene</a:t>
             </a:r>
           </a:p>
           <a:p>
             <a:pPr lvl="4"/>
             <a:r>
-              <a:rPr lang="de-DE" smtClean="0"/>
+              <a:rPr lang="de-DE"/>
               <a:t>Fünfte Ebene</a:t>
             </a:r>
             <a:endParaRPr lang="de-DE" dirty="0"/>
@@ -1205,35 +1196,35 @@
           <a:p>
             <a:pPr lvl="0"/>
             <a:r>
-              <a:rPr lang="de-DE" smtClean="0"/>
+              <a:rPr lang="de-DE"/>
               <a:t>Textmasterformat bearbeiten</a:t>
             </a:r>
           </a:p>
           <a:p>
             <a:pPr lvl="1"/>
             <a:r>
-              <a:rPr lang="de-DE" smtClean="0"/>
+              <a:rPr lang="de-DE"/>
               <a:t>Zweite Ebene</a:t>
             </a:r>
           </a:p>
           <a:p>
             <a:pPr lvl="2"/>
             <a:r>
-              <a:rPr lang="de-DE" smtClean="0"/>
+              <a:rPr lang="de-DE"/>
               <a:t>Dritte Ebene</a:t>
             </a:r>
           </a:p>
           <a:p>
             <a:pPr lvl="3"/>
             <a:r>
-              <a:rPr lang="de-DE" smtClean="0"/>
+              <a:rPr lang="de-DE"/>
               <a:t>Vierte Ebene</a:t>
             </a:r>
           </a:p>
           <a:p>
             <a:pPr lvl="4"/>
             <a:r>
-              <a:rPr lang="de-DE" smtClean="0"/>
+              <a:rPr lang="de-DE"/>
               <a:t>Fünfte Ebene</a:t>
             </a:r>
             <a:endParaRPr lang="de-DE" dirty="0"/>
@@ -1280,7 +1271,7 @@
           </a:lstStyle>
           <a:p>
             <a:r>
-              <a:rPr lang="de-DE" smtClean="0"/>
+              <a:rPr lang="de-DE"/>
               <a:t>Titelmasterformat durch Klicken bearbeiten</a:t>
             </a:r>
             <a:endParaRPr lang="de-DE" dirty="0"/>
@@ -1317,7 +1308,7 @@
           <a:lstStyle/>
           <a:p>
             <a:pPr algn="ctr"/>
-            <a:endParaRPr lang="de-DE" sz="1600" dirty="0" err="1" smtClean="0"/>
+            <a:endParaRPr lang="de-DE" sz="1600" dirty="0" err="1"/>
           </a:p>
         </p:txBody>
       </p:sp>
@@ -1353,7 +1344,7 @@
           <a:lstStyle/>
           <a:p>
             <a:pPr algn="ctr"/>
-            <a:endParaRPr lang="de-DE" sz="1600" dirty="0" err="1" smtClean="0"/>
+            <a:endParaRPr lang="de-DE" sz="1600" dirty="0" err="1"/>
           </a:p>
         </p:txBody>
       </p:sp>
@@ -1396,10 +1387,9 @@
               </a:spcBef>
             </a:pPr>
             <a:r>
-              <a:rPr lang="en-GB" smtClean="0"/>
+              <a:rPr lang="en-GB"/>
               <a:t>C4: On-the-fly Compute Center II</a:t>
             </a:r>
-            <a:endParaRPr lang="en-GB"/>
           </a:p>
         </p:txBody>
       </p:sp>
@@ -1413,13 +1403,6 @@
   <p:clrMapOvr>
     <a:masterClrMapping/>
   </p:clrMapOvr>
-  <p:timing>
-    <p:tnLst>
-      <p:par>
-        <p:cTn id="1" dur="indefinite" restart="never" nodeType="tmRoot"/>
-      </p:par>
-    </p:tnLst>
-  </p:timing>
 </p:sldLayout>
 </file>
 
@@ -1480,7 +1463,7 @@
           </a:lstStyle>
           <a:p>
             <a:r>
-              <a:rPr lang="de-DE" smtClean="0"/>
+              <a:rPr lang="de-DE"/>
               <a:t>Titelmasterformat durch Klicken bearbeiten</a:t>
             </a:r>
             <a:endParaRPr lang="de-DE" dirty="0"/>
@@ -1517,7 +1500,7 @@
           <a:lstStyle/>
           <a:p>
             <a:pPr algn="ctr"/>
-            <a:endParaRPr lang="de-DE" sz="1600" dirty="0" err="1" smtClean="0"/>
+            <a:endParaRPr lang="de-DE" sz="1600" dirty="0" err="1"/>
           </a:p>
         </p:txBody>
       </p:sp>
@@ -1553,7 +1536,7 @@
           <a:lstStyle/>
           <a:p>
             <a:pPr algn="ctr"/>
-            <a:endParaRPr lang="de-DE" sz="1600" dirty="0" err="1" smtClean="0"/>
+            <a:endParaRPr lang="de-DE" sz="1600" dirty="0" err="1"/>
           </a:p>
         </p:txBody>
       </p:sp>
@@ -1650,35 +1633,35 @@
           <a:p>
             <a:pPr lvl="0"/>
             <a:r>
-              <a:rPr lang="de-DE" smtClean="0"/>
+              <a:rPr lang="de-DE"/>
               <a:t>Textmasterformat bearbeiten</a:t>
             </a:r>
           </a:p>
           <a:p>
             <a:pPr lvl="1"/>
             <a:r>
-              <a:rPr lang="de-DE" smtClean="0"/>
+              <a:rPr lang="de-DE"/>
               <a:t>Zweite Ebene</a:t>
             </a:r>
           </a:p>
           <a:p>
             <a:pPr lvl="2"/>
             <a:r>
-              <a:rPr lang="de-DE" smtClean="0"/>
+              <a:rPr lang="de-DE"/>
               <a:t>Dritte Ebene</a:t>
             </a:r>
           </a:p>
           <a:p>
             <a:pPr lvl="3"/>
             <a:r>
-              <a:rPr lang="de-DE" smtClean="0"/>
+              <a:rPr lang="de-DE"/>
               <a:t>Vierte Ebene</a:t>
             </a:r>
           </a:p>
           <a:p>
             <a:pPr lvl="4"/>
             <a:r>
-              <a:rPr lang="de-DE" smtClean="0"/>
+              <a:rPr lang="de-DE"/>
               <a:t>Fünfte Ebene</a:t>
             </a:r>
             <a:endParaRPr lang="de-DE" dirty="0"/>
@@ -1778,35 +1761,35 @@
           <a:p>
             <a:pPr lvl="0"/>
             <a:r>
-              <a:rPr lang="de-DE" smtClean="0"/>
+              <a:rPr lang="de-DE"/>
               <a:t>Textmasterformat bearbeiten</a:t>
             </a:r>
           </a:p>
           <a:p>
             <a:pPr lvl="1"/>
             <a:r>
-              <a:rPr lang="de-DE" smtClean="0"/>
+              <a:rPr lang="de-DE"/>
               <a:t>Zweite Ebene</a:t>
             </a:r>
           </a:p>
           <a:p>
             <a:pPr lvl="2"/>
             <a:r>
-              <a:rPr lang="de-DE" smtClean="0"/>
+              <a:rPr lang="de-DE"/>
               <a:t>Dritte Ebene</a:t>
             </a:r>
           </a:p>
           <a:p>
             <a:pPr lvl="3"/>
             <a:r>
-              <a:rPr lang="de-DE" smtClean="0"/>
+              <a:rPr lang="de-DE"/>
               <a:t>Vierte Ebene</a:t>
             </a:r>
           </a:p>
           <a:p>
             <a:pPr lvl="4"/>
             <a:r>
-              <a:rPr lang="de-DE" smtClean="0"/>
+              <a:rPr lang="de-DE"/>
               <a:t>Fünfte Ebene</a:t>
             </a:r>
             <a:endParaRPr lang="de-DE" dirty="0"/>
@@ -1852,10 +1835,9 @@
               </a:spcBef>
             </a:pPr>
             <a:r>
-              <a:rPr lang="en-GB" smtClean="0"/>
+              <a:rPr lang="en-GB"/>
               <a:t>C4: On-the-fly Compute Center II</a:t>
             </a:r>
-            <a:endParaRPr lang="en-GB"/>
           </a:p>
         </p:txBody>
       </p:sp>
@@ -1869,13 +1851,6 @@
   <p:clrMapOvr>
     <a:masterClrMapping/>
   </p:clrMapOvr>
-  <p:timing>
-    <p:tnLst>
-      <p:par>
-        <p:cTn id="1" dur="indefinite" restart="never" nodeType="tmRoot"/>
-      </p:par>
-    </p:tnLst>
-  </p:timing>
 </p:sldLayout>
 </file>
 
@@ -1936,7 +1911,7 @@
           </a:lstStyle>
           <a:p>
             <a:r>
-              <a:rPr lang="de-DE" smtClean="0"/>
+              <a:rPr lang="de-DE"/>
               <a:t>Titelmasterformat durch Klicken bearbeiten</a:t>
             </a:r>
             <a:endParaRPr lang="de-DE" dirty="0"/>
@@ -1973,7 +1948,7 @@
           <a:lstStyle/>
           <a:p>
             <a:pPr algn="ctr"/>
-            <a:endParaRPr lang="de-DE" sz="1600" dirty="0" err="1" smtClean="0"/>
+            <a:endParaRPr lang="de-DE" sz="1600" dirty="0" err="1"/>
           </a:p>
         </p:txBody>
       </p:sp>
@@ -2025,7 +2000,7 @@
           <a:p>
             <a:pPr lvl="0"/>
             <a:r>
-              <a:rPr lang="de-DE" smtClean="0"/>
+              <a:rPr lang="de-DE"/>
               <a:t>Textmasterformat bearbeiten</a:t>
             </a:r>
           </a:p>
@@ -2063,7 +2038,7 @@
           <a:lstStyle/>
           <a:p>
             <a:pPr algn="ctr"/>
-            <a:endParaRPr lang="de-DE" sz="1600" dirty="0" err="1" smtClean="0"/>
+            <a:endParaRPr lang="de-DE" sz="1600" dirty="0" err="1"/>
           </a:p>
         </p:txBody>
       </p:sp>
@@ -2160,35 +2135,35 @@
           <a:p>
             <a:pPr lvl="0"/>
             <a:r>
-              <a:rPr lang="de-DE" smtClean="0"/>
+              <a:rPr lang="de-DE"/>
               <a:t>Textmasterformat bearbeiten</a:t>
             </a:r>
           </a:p>
           <a:p>
             <a:pPr lvl="1"/>
             <a:r>
-              <a:rPr lang="de-DE" smtClean="0"/>
+              <a:rPr lang="de-DE"/>
               <a:t>Zweite Ebene</a:t>
             </a:r>
           </a:p>
           <a:p>
             <a:pPr lvl="2"/>
             <a:r>
-              <a:rPr lang="de-DE" smtClean="0"/>
+              <a:rPr lang="de-DE"/>
               <a:t>Dritte Ebene</a:t>
             </a:r>
           </a:p>
           <a:p>
             <a:pPr lvl="3"/>
             <a:r>
-              <a:rPr lang="de-DE" smtClean="0"/>
+              <a:rPr lang="de-DE"/>
               <a:t>Vierte Ebene</a:t>
             </a:r>
           </a:p>
           <a:p>
             <a:pPr lvl="4"/>
             <a:r>
-              <a:rPr lang="de-DE" smtClean="0"/>
+              <a:rPr lang="de-DE"/>
               <a:t>Fünfte Ebene</a:t>
             </a:r>
             <a:endParaRPr lang="de-DE" dirty="0"/>
@@ -2288,35 +2263,35 @@
           <a:p>
             <a:pPr lvl="0"/>
             <a:r>
-              <a:rPr lang="de-DE" smtClean="0"/>
+              <a:rPr lang="de-DE"/>
               <a:t>Textmasterformat bearbeiten</a:t>
             </a:r>
           </a:p>
           <a:p>
             <a:pPr lvl="1"/>
             <a:r>
-              <a:rPr lang="de-DE" smtClean="0"/>
+              <a:rPr lang="de-DE"/>
               <a:t>Zweite Ebene</a:t>
             </a:r>
           </a:p>
           <a:p>
             <a:pPr lvl="2"/>
             <a:r>
-              <a:rPr lang="de-DE" smtClean="0"/>
+              <a:rPr lang="de-DE"/>
               <a:t>Dritte Ebene</a:t>
             </a:r>
           </a:p>
           <a:p>
             <a:pPr lvl="3"/>
             <a:r>
-              <a:rPr lang="de-DE" smtClean="0"/>
+              <a:rPr lang="de-DE"/>
               <a:t>Vierte Ebene</a:t>
             </a:r>
           </a:p>
           <a:p>
             <a:pPr lvl="4"/>
             <a:r>
-              <a:rPr lang="de-DE" smtClean="0"/>
+              <a:rPr lang="de-DE"/>
               <a:t>Fünfte Ebene</a:t>
             </a:r>
             <a:endParaRPr lang="de-DE" dirty="0"/>
@@ -2362,10 +2337,9 @@
               </a:spcBef>
             </a:pPr>
             <a:r>
-              <a:rPr lang="en-GB" smtClean="0"/>
+              <a:rPr lang="en-GB"/>
               <a:t>C4: On-the-fly Compute Center II</a:t>
             </a:r>
-            <a:endParaRPr lang="en-GB"/>
           </a:p>
         </p:txBody>
       </p:sp>
@@ -2379,13 +2353,6 @@
   <p:clrMapOvr>
     <a:masterClrMapping/>
   </p:clrMapOvr>
-  <p:timing>
-    <p:tnLst>
-      <p:par>
-        <p:cTn id="1" dur="indefinite" restart="never" nodeType="tmRoot"/>
-      </p:par>
-    </p:tnLst>
-  </p:timing>
 </p:sldLayout>
 </file>
 
@@ -2430,10 +2397,9 @@
           <a:lstStyle/>
           <a:p>
             <a:r>
-              <a:rPr lang="de-DE" smtClean="0"/>
+              <a:rPr lang="de-DE"/>
               <a:t>Bild durch Klicken auf Symbol hinzufügen</a:t>
             </a:r>
-            <a:endParaRPr lang="de-DE"/>
           </a:p>
         </p:txBody>
       </p:sp>
@@ -2477,7 +2443,7 @@
           </a:lstStyle>
           <a:p>
             <a:r>
-              <a:rPr lang="de-DE" smtClean="0"/>
+              <a:rPr lang="de-DE"/>
               <a:t>Titelmasterformat durch Klicken bearbeiten</a:t>
             </a:r>
             <a:endParaRPr lang="de-DE" dirty="0"/>
@@ -2514,7 +2480,7 @@
           <a:lstStyle/>
           <a:p>
             <a:pPr algn="ctr"/>
-            <a:endParaRPr lang="de-DE" sz="1600" dirty="0" err="1" smtClean="0"/>
+            <a:endParaRPr lang="de-DE" sz="1600" dirty="0" err="1"/>
           </a:p>
         </p:txBody>
       </p:sp>
@@ -2550,7 +2516,7 @@
           <a:lstStyle/>
           <a:p>
             <a:pPr algn="ctr"/>
-            <a:endParaRPr lang="de-DE" sz="1600" dirty="0" err="1" smtClean="0"/>
+            <a:endParaRPr lang="de-DE" sz="1600" dirty="0" err="1"/>
           </a:p>
         </p:txBody>
       </p:sp>
@@ -2647,35 +2613,35 @@
           <a:p>
             <a:pPr lvl="0"/>
             <a:r>
-              <a:rPr lang="de-DE" smtClean="0"/>
+              <a:rPr lang="de-DE"/>
               <a:t>Textmasterformat bearbeiten</a:t>
             </a:r>
           </a:p>
           <a:p>
             <a:pPr lvl="1"/>
             <a:r>
-              <a:rPr lang="de-DE" smtClean="0"/>
+              <a:rPr lang="de-DE"/>
               <a:t>Zweite Ebene</a:t>
             </a:r>
           </a:p>
           <a:p>
             <a:pPr lvl="2"/>
             <a:r>
-              <a:rPr lang="de-DE" smtClean="0"/>
+              <a:rPr lang="de-DE"/>
               <a:t>Dritte Ebene</a:t>
             </a:r>
           </a:p>
           <a:p>
             <a:pPr lvl="3"/>
             <a:r>
-              <a:rPr lang="de-DE" smtClean="0"/>
+              <a:rPr lang="de-DE"/>
               <a:t>Vierte Ebene</a:t>
             </a:r>
           </a:p>
           <a:p>
             <a:pPr lvl="4"/>
             <a:r>
-              <a:rPr lang="de-DE" smtClean="0"/>
+              <a:rPr lang="de-DE"/>
               <a:t>Fünfte Ebene</a:t>
             </a:r>
             <a:endParaRPr lang="de-DE" dirty="0"/>
@@ -2721,10 +2687,9 @@
               </a:spcBef>
             </a:pPr>
             <a:r>
-              <a:rPr lang="en-GB" smtClean="0"/>
+              <a:rPr lang="en-GB"/>
               <a:t>C4: On-the-fly Compute Center II</a:t>
             </a:r>
-            <a:endParaRPr lang="en-GB"/>
           </a:p>
         </p:txBody>
       </p:sp>
@@ -2738,13 +2703,6 @@
   <p:clrMapOvr>
     <a:masterClrMapping/>
   </p:clrMapOvr>
-  <p:timing>
-    <p:tnLst>
-      <p:par>
-        <p:cTn id="1" dur="indefinite" restart="never" nodeType="tmRoot"/>
-      </p:par>
-    </p:tnLst>
-  </p:timing>
 </p:sldLayout>
 </file>
 
@@ -2805,7 +2763,7 @@
           </a:lstStyle>
           <a:p>
             <a:r>
-              <a:rPr lang="de-DE" smtClean="0"/>
+              <a:rPr lang="de-DE"/>
               <a:t>Titelmasterformat durch Klicken bearbeiten</a:t>
             </a:r>
             <a:endParaRPr lang="de-DE" dirty="0"/>
@@ -2842,7 +2800,7 @@
           <a:lstStyle/>
           <a:p>
             <a:pPr algn="ctr"/>
-            <a:endParaRPr lang="de-DE" sz="1600" dirty="0" err="1" smtClean="0"/>
+            <a:endParaRPr lang="de-DE" sz="1600" dirty="0" err="1"/>
           </a:p>
         </p:txBody>
       </p:sp>
@@ -2878,7 +2836,7 @@
           <a:lstStyle/>
           <a:p>
             <a:pPr algn="ctr"/>
-            <a:endParaRPr lang="de-DE" sz="1600" dirty="0" err="1" smtClean="0"/>
+            <a:endParaRPr lang="de-DE" sz="1600" dirty="0" err="1"/>
           </a:p>
         </p:txBody>
       </p:sp>
@@ -2906,10 +2864,9 @@
           <a:lstStyle/>
           <a:p>
             <a:r>
-              <a:rPr lang="de-DE" smtClean="0"/>
+              <a:rPr lang="de-DE"/>
               <a:t>Bild durch Klicken auf Symbol hinzufügen</a:t>
             </a:r>
-            <a:endParaRPr lang="de-DE"/>
           </a:p>
         </p:txBody>
       </p:sp>
@@ -3006,35 +2963,35 @@
           <a:p>
             <a:pPr lvl="0"/>
             <a:r>
-              <a:rPr lang="de-DE" smtClean="0"/>
+              <a:rPr lang="de-DE"/>
               <a:t>Textmasterformat bearbeiten</a:t>
             </a:r>
           </a:p>
           <a:p>
             <a:pPr lvl="1"/>
             <a:r>
-              <a:rPr lang="de-DE" smtClean="0"/>
+              <a:rPr lang="de-DE"/>
               <a:t>Zweite Ebene</a:t>
             </a:r>
           </a:p>
           <a:p>
             <a:pPr lvl="2"/>
             <a:r>
-              <a:rPr lang="de-DE" smtClean="0"/>
+              <a:rPr lang="de-DE"/>
               <a:t>Dritte Ebene</a:t>
             </a:r>
           </a:p>
           <a:p>
             <a:pPr lvl="3"/>
             <a:r>
-              <a:rPr lang="de-DE" smtClean="0"/>
+              <a:rPr lang="de-DE"/>
               <a:t>Vierte Ebene</a:t>
             </a:r>
           </a:p>
           <a:p>
             <a:pPr lvl="4"/>
             <a:r>
-              <a:rPr lang="de-DE" smtClean="0"/>
+              <a:rPr lang="de-DE"/>
               <a:t>Fünfte Ebene</a:t>
             </a:r>
             <a:endParaRPr lang="de-DE" dirty="0"/>
@@ -3080,10 +3037,9 @@
               </a:spcBef>
             </a:pPr>
             <a:r>
-              <a:rPr lang="en-GB" smtClean="0"/>
+              <a:rPr lang="en-GB"/>
               <a:t>C4: On-the-fly Compute Center II</a:t>
             </a:r>
-            <a:endParaRPr lang="en-GB"/>
           </a:p>
         </p:txBody>
       </p:sp>
@@ -3097,13 +3053,6 @@
   <p:clrMapOvr>
     <a:masterClrMapping/>
   </p:clrMapOvr>
-  <p:timing>
-    <p:tnLst>
-      <p:par>
-        <p:cTn id="1" dur="indefinite" restart="never" nodeType="tmRoot"/>
-      </p:par>
-    </p:tnLst>
-  </p:timing>
 </p:sldLayout>
 </file>
 
@@ -3164,7 +3113,7 @@
           </a:lstStyle>
           <a:p>
             <a:r>
-              <a:rPr lang="de-DE" smtClean="0"/>
+              <a:rPr lang="de-DE"/>
               <a:t>Titelmasterformat durch Klicken bearbeiten</a:t>
             </a:r>
             <a:endParaRPr lang="de-DE" dirty="0"/>
@@ -3201,7 +3150,7 @@
           <a:lstStyle/>
           <a:p>
             <a:pPr algn="ctr"/>
-            <a:endParaRPr lang="de-DE" sz="1600" dirty="0" err="1" smtClean="0"/>
+            <a:endParaRPr lang="de-DE" sz="1600" dirty="0" err="1"/>
           </a:p>
         </p:txBody>
       </p:sp>
@@ -3253,7 +3202,7 @@
           <a:p>
             <a:pPr lvl="0"/>
             <a:r>
-              <a:rPr lang="de-DE" smtClean="0"/>
+              <a:rPr lang="de-DE"/>
               <a:t>Textmasterformat bearbeiten</a:t>
             </a:r>
           </a:p>
@@ -3291,7 +3240,7 @@
           <a:lstStyle/>
           <a:p>
             <a:pPr algn="ctr"/>
-            <a:endParaRPr lang="de-DE" sz="1600" dirty="0" err="1" smtClean="0"/>
+            <a:endParaRPr lang="de-DE" sz="1600" dirty="0" err="1"/>
           </a:p>
         </p:txBody>
       </p:sp>
@@ -3319,10 +3268,9 @@
           <a:lstStyle/>
           <a:p>
             <a:r>
-              <a:rPr lang="de-DE" smtClean="0"/>
+              <a:rPr lang="de-DE"/>
               <a:t>Bild durch Klicken auf Symbol hinzufügen</a:t>
             </a:r>
-            <a:endParaRPr lang="de-DE"/>
           </a:p>
         </p:txBody>
       </p:sp>
@@ -3419,35 +3367,35 @@
           <a:p>
             <a:pPr lvl="0"/>
             <a:r>
-              <a:rPr lang="de-DE" smtClean="0"/>
+              <a:rPr lang="de-DE"/>
               <a:t>Textmasterformat bearbeiten</a:t>
             </a:r>
           </a:p>
           <a:p>
             <a:pPr lvl="1"/>
             <a:r>
-              <a:rPr lang="de-DE" smtClean="0"/>
+              <a:rPr lang="de-DE"/>
               <a:t>Zweite Ebene</a:t>
             </a:r>
           </a:p>
           <a:p>
             <a:pPr lvl="2"/>
             <a:r>
-              <a:rPr lang="de-DE" smtClean="0"/>
+              <a:rPr lang="de-DE"/>
               <a:t>Dritte Ebene</a:t>
             </a:r>
           </a:p>
           <a:p>
             <a:pPr lvl="3"/>
             <a:r>
-              <a:rPr lang="de-DE" smtClean="0"/>
+              <a:rPr lang="de-DE"/>
               <a:t>Vierte Ebene</a:t>
             </a:r>
           </a:p>
           <a:p>
             <a:pPr lvl="4"/>
             <a:r>
-              <a:rPr lang="de-DE" smtClean="0"/>
+              <a:rPr lang="de-DE"/>
               <a:t>Fünfte Ebene</a:t>
             </a:r>
             <a:endParaRPr lang="de-DE" dirty="0"/>
@@ -3493,10 +3441,9 @@
               </a:spcBef>
             </a:pPr>
             <a:r>
-              <a:rPr lang="en-GB" smtClean="0"/>
+              <a:rPr lang="en-GB"/>
               <a:t>C4: On-the-fly Compute Center II</a:t>
             </a:r>
-            <a:endParaRPr lang="en-GB"/>
           </a:p>
         </p:txBody>
       </p:sp>
@@ -3510,13 +3457,6 @@
   <p:clrMapOvr>
     <a:masterClrMapping/>
   </p:clrMapOvr>
-  <p:timing>
-    <p:tnLst>
-      <p:par>
-        <p:cTn id="1" dur="indefinite" restart="never" nodeType="tmRoot"/>
-      </p:par>
-    </p:tnLst>
-  </p:timing>
 </p:sldLayout>
 </file>
 
@@ -3630,35 +3570,35 @@
           <a:p>
             <a:pPr lvl="0"/>
             <a:r>
-              <a:rPr lang="de-DE" smtClean="0"/>
+              <a:rPr lang="de-DE"/>
               <a:t>Textmasterformat bearbeiten</a:t>
             </a:r>
           </a:p>
           <a:p>
             <a:pPr lvl="1"/>
             <a:r>
-              <a:rPr lang="de-DE" smtClean="0"/>
+              <a:rPr lang="de-DE"/>
               <a:t>Zweite Ebene</a:t>
             </a:r>
           </a:p>
           <a:p>
             <a:pPr lvl="2"/>
             <a:r>
-              <a:rPr lang="de-DE" smtClean="0"/>
+              <a:rPr lang="de-DE"/>
               <a:t>Dritte Ebene</a:t>
             </a:r>
           </a:p>
           <a:p>
             <a:pPr lvl="3"/>
             <a:r>
-              <a:rPr lang="de-DE" smtClean="0"/>
+              <a:rPr lang="de-DE"/>
               <a:t>Vierte Ebene</a:t>
             </a:r>
           </a:p>
           <a:p>
             <a:pPr lvl="4"/>
             <a:r>
-              <a:rPr lang="de-DE" smtClean="0"/>
+              <a:rPr lang="de-DE"/>
               <a:t>Fünfte Ebene</a:t>
             </a:r>
             <a:endParaRPr lang="de-DE" dirty="0"/>
@@ -3758,35 +3698,35 @@
           <a:p>
             <a:pPr lvl="0"/>
             <a:r>
-              <a:rPr lang="de-DE" smtClean="0"/>
+              <a:rPr lang="de-DE"/>
               <a:t>Textmasterformat bearbeiten</a:t>
             </a:r>
           </a:p>
           <a:p>
             <a:pPr lvl="1"/>
             <a:r>
-              <a:rPr lang="de-DE" smtClean="0"/>
+              <a:rPr lang="de-DE"/>
               <a:t>Zweite Ebene</a:t>
             </a:r>
           </a:p>
           <a:p>
             <a:pPr lvl="2"/>
             <a:r>
-              <a:rPr lang="de-DE" smtClean="0"/>
+              <a:rPr lang="de-DE"/>
               <a:t>Dritte Ebene</a:t>
             </a:r>
           </a:p>
           <a:p>
             <a:pPr lvl="3"/>
             <a:r>
-              <a:rPr lang="de-DE" smtClean="0"/>
+              <a:rPr lang="de-DE"/>
               <a:t>Vierte Ebene</a:t>
             </a:r>
           </a:p>
           <a:p>
             <a:pPr lvl="4"/>
             <a:r>
-              <a:rPr lang="de-DE" smtClean="0"/>
+              <a:rPr lang="de-DE"/>
               <a:t>Fünfte Ebene</a:t>
             </a:r>
             <a:endParaRPr lang="de-DE" dirty="0"/>
@@ -3833,7 +3773,7 @@
           </a:lstStyle>
           <a:p>
             <a:r>
-              <a:rPr lang="de-DE" smtClean="0"/>
+              <a:rPr lang="de-DE"/>
               <a:t>Titelmasterformat durch Klicken bearbeiten</a:t>
             </a:r>
             <a:endParaRPr lang="de-DE" dirty="0"/>
@@ -3870,7 +3810,7 @@
           <a:lstStyle/>
           <a:p>
             <a:pPr algn="ctr"/>
-            <a:endParaRPr lang="de-DE" sz="1600" dirty="0" err="1" smtClean="0"/>
+            <a:endParaRPr lang="de-DE" sz="1600" dirty="0" err="1"/>
           </a:p>
         </p:txBody>
       </p:sp>
@@ -3906,7 +3846,7 @@
           <a:lstStyle/>
           <a:p>
             <a:pPr algn="ctr"/>
-            <a:endParaRPr lang="de-DE" sz="1600" dirty="0" err="1" smtClean="0"/>
+            <a:endParaRPr lang="de-DE" sz="1600" dirty="0" err="1"/>
           </a:p>
         </p:txBody>
       </p:sp>
@@ -4003,35 +3943,35 @@
           <a:p>
             <a:pPr lvl="0"/>
             <a:r>
-              <a:rPr lang="de-DE" smtClean="0"/>
+              <a:rPr lang="de-DE"/>
               <a:t>Textmasterformat bearbeiten</a:t>
             </a:r>
           </a:p>
           <a:p>
             <a:pPr lvl="1"/>
             <a:r>
-              <a:rPr lang="de-DE" smtClean="0"/>
+              <a:rPr lang="de-DE"/>
               <a:t>Zweite Ebene</a:t>
             </a:r>
           </a:p>
           <a:p>
             <a:pPr lvl="2"/>
             <a:r>
-              <a:rPr lang="de-DE" smtClean="0"/>
+              <a:rPr lang="de-DE"/>
               <a:t>Dritte Ebene</a:t>
             </a:r>
           </a:p>
           <a:p>
             <a:pPr lvl="3"/>
             <a:r>
-              <a:rPr lang="de-DE" smtClean="0"/>
+              <a:rPr lang="de-DE"/>
               <a:t>Vierte Ebene</a:t>
             </a:r>
           </a:p>
           <a:p>
             <a:pPr lvl="4"/>
             <a:r>
-              <a:rPr lang="de-DE" smtClean="0"/>
+              <a:rPr lang="de-DE"/>
               <a:t>Fünfte Ebene</a:t>
             </a:r>
             <a:endParaRPr lang="de-DE" dirty="0"/>
@@ -4131,35 +4071,35 @@
           <a:p>
             <a:pPr lvl="0"/>
             <a:r>
-              <a:rPr lang="de-DE" smtClean="0"/>
+              <a:rPr lang="de-DE"/>
               <a:t>Textmasterformat bearbeiten</a:t>
             </a:r>
           </a:p>
           <a:p>
             <a:pPr lvl="1"/>
             <a:r>
-              <a:rPr lang="de-DE" smtClean="0"/>
+              <a:rPr lang="de-DE"/>
               <a:t>Zweite Ebene</a:t>
             </a:r>
           </a:p>
           <a:p>
             <a:pPr lvl="2"/>
             <a:r>
-              <a:rPr lang="de-DE" smtClean="0"/>
+              <a:rPr lang="de-DE"/>
               <a:t>Dritte Ebene</a:t>
             </a:r>
           </a:p>
           <a:p>
             <a:pPr lvl="3"/>
             <a:r>
-              <a:rPr lang="de-DE" smtClean="0"/>
+              <a:rPr lang="de-DE"/>
               <a:t>Vierte Ebene</a:t>
             </a:r>
           </a:p>
           <a:p>
             <a:pPr lvl="4"/>
             <a:r>
-              <a:rPr lang="de-DE" smtClean="0"/>
+              <a:rPr lang="de-DE"/>
               <a:t>Fünfte Ebene</a:t>
             </a:r>
             <a:endParaRPr lang="de-DE" dirty="0"/>
@@ -4205,10 +4145,9 @@
               </a:spcBef>
             </a:pPr>
             <a:r>
-              <a:rPr lang="en-GB" smtClean="0"/>
+              <a:rPr lang="en-GB"/>
               <a:t>C4: On-the-fly Compute Center II</a:t>
             </a:r>
-            <a:endParaRPr lang="en-GB"/>
           </a:p>
         </p:txBody>
       </p:sp>
@@ -4222,13 +4161,6 @@
   <p:clrMapOvr>
     <a:masterClrMapping/>
   </p:clrMapOvr>
-  <p:timing>
-    <p:tnLst>
-      <p:par>
-        <p:cTn id="1" dur="indefinite" restart="never" nodeType="tmRoot"/>
-      </p:par>
-    </p:tnLst>
-  </p:timing>
 </p:sldLayout>
 </file>
 
@@ -4289,7 +4221,7 @@
           </a:lstStyle>
           <a:p>
             <a:r>
-              <a:rPr lang="de-DE" smtClean="0"/>
+              <a:rPr lang="de-DE"/>
               <a:t>Titelmasterformat durch Klicken bearbeiten</a:t>
             </a:r>
             <a:endParaRPr lang="de-DE" dirty="0"/>
@@ -4326,7 +4258,7 @@
           <a:lstStyle/>
           <a:p>
             <a:pPr algn="ctr"/>
-            <a:endParaRPr lang="de-DE" sz="1600" dirty="0" err="1" smtClean="0"/>
+            <a:endParaRPr lang="de-DE" sz="1600" dirty="0" err="1"/>
           </a:p>
         </p:txBody>
       </p:sp>
@@ -4362,7 +4294,7 @@
           <a:lstStyle/>
           <a:p>
             <a:pPr algn="ctr"/>
-            <a:endParaRPr lang="de-DE" sz="1600" dirty="0" err="1" smtClean="0"/>
+            <a:endParaRPr lang="de-DE" sz="1600" dirty="0" err="1"/>
           </a:p>
         </p:txBody>
       </p:sp>
@@ -4459,35 +4391,35 @@
           <a:p>
             <a:pPr lvl="0"/>
             <a:r>
-              <a:rPr lang="de-DE" smtClean="0"/>
+              <a:rPr lang="de-DE"/>
               <a:t>Textmasterformat bearbeiten</a:t>
             </a:r>
           </a:p>
           <a:p>
             <a:pPr lvl="1"/>
             <a:r>
-              <a:rPr lang="de-DE" smtClean="0"/>
+              <a:rPr lang="de-DE"/>
               <a:t>Zweite Ebene</a:t>
             </a:r>
           </a:p>
           <a:p>
             <a:pPr lvl="2"/>
             <a:r>
-              <a:rPr lang="de-DE" smtClean="0"/>
+              <a:rPr lang="de-DE"/>
               <a:t>Dritte Ebene</a:t>
             </a:r>
           </a:p>
           <a:p>
             <a:pPr lvl="3"/>
             <a:r>
-              <a:rPr lang="de-DE" smtClean="0"/>
+              <a:rPr lang="de-DE"/>
               <a:t>Vierte Ebene</a:t>
             </a:r>
           </a:p>
           <a:p>
             <a:pPr lvl="4"/>
             <a:r>
-              <a:rPr lang="de-DE" smtClean="0"/>
+              <a:rPr lang="de-DE"/>
               <a:t>Fünfte Ebene</a:t>
             </a:r>
             <a:endParaRPr lang="de-DE" dirty="0"/>
@@ -4587,35 +4519,35 @@
           <a:p>
             <a:pPr lvl="0"/>
             <a:r>
-              <a:rPr lang="de-DE" smtClean="0"/>
+              <a:rPr lang="de-DE"/>
               <a:t>Textmasterformat bearbeiten</a:t>
             </a:r>
           </a:p>
           <a:p>
             <a:pPr lvl="1"/>
             <a:r>
-              <a:rPr lang="de-DE" smtClean="0"/>
+              <a:rPr lang="de-DE"/>
               <a:t>Zweite Ebene</a:t>
             </a:r>
           </a:p>
           <a:p>
             <a:pPr lvl="2"/>
             <a:r>
-              <a:rPr lang="de-DE" smtClean="0"/>
+              <a:rPr lang="de-DE"/>
               <a:t>Dritte Ebene</a:t>
             </a:r>
           </a:p>
           <a:p>
             <a:pPr lvl="3"/>
             <a:r>
-              <a:rPr lang="de-DE" smtClean="0"/>
+              <a:rPr lang="de-DE"/>
               <a:t>Vierte Ebene</a:t>
             </a:r>
           </a:p>
           <a:p>
             <a:pPr lvl="4"/>
             <a:r>
-              <a:rPr lang="de-DE" smtClean="0"/>
+              <a:rPr lang="de-DE"/>
               <a:t>Fünfte Ebene</a:t>
             </a:r>
             <a:endParaRPr lang="de-DE" dirty="0"/>
@@ -4715,35 +4647,35 @@
           <a:p>
             <a:pPr lvl="0"/>
             <a:r>
-              <a:rPr lang="de-DE" smtClean="0"/>
+              <a:rPr lang="de-DE"/>
               <a:t>Textmasterformat bearbeiten</a:t>
             </a:r>
           </a:p>
           <a:p>
             <a:pPr lvl="1"/>
             <a:r>
-              <a:rPr lang="de-DE" smtClean="0"/>
+              <a:rPr lang="de-DE"/>
               <a:t>Zweite Ebene</a:t>
             </a:r>
           </a:p>
           <a:p>
             <a:pPr lvl="2"/>
             <a:r>
-              <a:rPr lang="de-DE" smtClean="0"/>
+              <a:rPr lang="de-DE"/>
               <a:t>Dritte Ebene</a:t>
             </a:r>
           </a:p>
           <a:p>
             <a:pPr lvl="3"/>
             <a:r>
-              <a:rPr lang="de-DE" smtClean="0"/>
+              <a:rPr lang="de-DE"/>
               <a:t>Vierte Ebene</a:t>
             </a:r>
           </a:p>
           <a:p>
             <a:pPr lvl="4"/>
             <a:r>
-              <a:rPr lang="de-DE" smtClean="0"/>
+              <a:rPr lang="de-DE"/>
               <a:t>Fünfte Ebene</a:t>
             </a:r>
             <a:endParaRPr lang="de-DE" dirty="0"/>
@@ -4843,35 +4775,35 @@
           <a:p>
             <a:pPr lvl="0"/>
             <a:r>
-              <a:rPr lang="de-DE" smtClean="0"/>
+              <a:rPr lang="de-DE"/>
               <a:t>Textmasterformat bearbeiten</a:t>
             </a:r>
           </a:p>
           <a:p>
             <a:pPr lvl="1"/>
             <a:r>
-              <a:rPr lang="de-DE" smtClean="0"/>
+              <a:rPr lang="de-DE"/>
               <a:t>Zweite Ebene</a:t>
             </a:r>
           </a:p>
           <a:p>
             <a:pPr lvl="2"/>
             <a:r>
-              <a:rPr lang="de-DE" smtClean="0"/>
+              <a:rPr lang="de-DE"/>
               <a:t>Dritte Ebene</a:t>
             </a:r>
           </a:p>
           <a:p>
             <a:pPr lvl="3"/>
             <a:r>
-              <a:rPr lang="de-DE" smtClean="0"/>
+              <a:rPr lang="de-DE"/>
               <a:t>Vierte Ebene</a:t>
             </a:r>
           </a:p>
           <a:p>
             <a:pPr lvl="4"/>
             <a:r>
-              <a:rPr lang="de-DE" smtClean="0"/>
+              <a:rPr lang="de-DE"/>
               <a:t>Fünfte Ebene</a:t>
             </a:r>
             <a:endParaRPr lang="de-DE" dirty="0"/>
@@ -4917,10 +4849,9 @@
               </a:spcBef>
             </a:pPr>
             <a:r>
-              <a:rPr lang="en-GB" smtClean="0"/>
+              <a:rPr lang="en-GB"/>
               <a:t>C4: On-the-fly Compute Center II</a:t>
             </a:r>
-            <a:endParaRPr lang="en-GB"/>
           </a:p>
         </p:txBody>
       </p:sp>
@@ -4934,13 +4865,6 @@
   <p:clrMapOvr>
     <a:masterClrMapping/>
   </p:clrMapOvr>
-  <p:timing>
-    <p:tnLst>
-      <p:par>
-        <p:cTn id="1" dur="indefinite" restart="never" nodeType="tmRoot"/>
-      </p:par>
-    </p:tnLst>
-  </p:timing>
 </p:sldLayout>
 </file>
 
@@ -5001,7 +4925,7 @@
           </a:lstStyle>
           <a:p>
             <a:r>
-              <a:rPr lang="de-DE" smtClean="0"/>
+              <a:rPr lang="de-DE"/>
               <a:t>Titelmasterformat durch Klicken bearbeiten</a:t>
             </a:r>
             <a:endParaRPr lang="de-DE" dirty="0"/>
@@ -5038,7 +4962,7 @@
           <a:lstStyle/>
           <a:p>
             <a:pPr algn="ctr"/>
-            <a:endParaRPr lang="de-DE" sz="1600" dirty="0" err="1" smtClean="0"/>
+            <a:endParaRPr lang="de-DE" sz="1600" dirty="0" err="1"/>
           </a:p>
         </p:txBody>
       </p:sp>
@@ -5090,7 +5014,7 @@
           <a:p>
             <a:pPr lvl="0"/>
             <a:r>
-              <a:rPr lang="de-DE" smtClean="0"/>
+              <a:rPr lang="de-DE"/>
               <a:t>Textmasterformat bearbeiten</a:t>
             </a:r>
           </a:p>
@@ -5128,7 +5052,7 @@
           <a:lstStyle/>
           <a:p>
             <a:pPr algn="ctr"/>
-            <a:endParaRPr lang="de-DE" sz="1600" dirty="0" err="1" smtClean="0"/>
+            <a:endParaRPr lang="de-DE" sz="1600" dirty="0" err="1"/>
           </a:p>
         </p:txBody>
       </p:sp>
@@ -5225,35 +5149,35 @@
           <a:p>
             <a:pPr lvl="0"/>
             <a:r>
-              <a:rPr lang="de-DE" smtClean="0"/>
+              <a:rPr lang="de-DE"/>
               <a:t>Textmasterformat bearbeiten</a:t>
             </a:r>
           </a:p>
           <a:p>
             <a:pPr lvl="1"/>
             <a:r>
-              <a:rPr lang="de-DE" smtClean="0"/>
+              <a:rPr lang="de-DE"/>
               <a:t>Zweite Ebene</a:t>
             </a:r>
           </a:p>
           <a:p>
             <a:pPr lvl="2"/>
             <a:r>
-              <a:rPr lang="de-DE" smtClean="0"/>
+              <a:rPr lang="de-DE"/>
               <a:t>Dritte Ebene</a:t>
             </a:r>
           </a:p>
           <a:p>
             <a:pPr lvl="3"/>
             <a:r>
-              <a:rPr lang="de-DE" smtClean="0"/>
+              <a:rPr lang="de-DE"/>
               <a:t>Vierte Ebene</a:t>
             </a:r>
           </a:p>
           <a:p>
             <a:pPr lvl="4"/>
             <a:r>
-              <a:rPr lang="de-DE" smtClean="0"/>
+              <a:rPr lang="de-DE"/>
               <a:t>Fünfte Ebene</a:t>
             </a:r>
             <a:endParaRPr lang="de-DE" dirty="0"/>
@@ -5353,35 +5277,35 @@
           <a:p>
             <a:pPr lvl="0"/>
             <a:r>
-              <a:rPr lang="de-DE" smtClean="0"/>
+              <a:rPr lang="de-DE"/>
               <a:t>Textmasterformat bearbeiten</a:t>
             </a:r>
           </a:p>
           <a:p>
             <a:pPr lvl="1"/>
             <a:r>
-              <a:rPr lang="de-DE" smtClean="0"/>
+              <a:rPr lang="de-DE"/>
               <a:t>Zweite Ebene</a:t>
             </a:r>
           </a:p>
           <a:p>
             <a:pPr lvl="2"/>
             <a:r>
-              <a:rPr lang="de-DE" smtClean="0"/>
+              <a:rPr lang="de-DE"/>
               <a:t>Dritte Ebene</a:t>
             </a:r>
           </a:p>
           <a:p>
             <a:pPr lvl="3"/>
             <a:r>
-              <a:rPr lang="de-DE" smtClean="0"/>
+              <a:rPr lang="de-DE"/>
               <a:t>Vierte Ebene</a:t>
             </a:r>
           </a:p>
           <a:p>
             <a:pPr lvl="4"/>
             <a:r>
-              <a:rPr lang="de-DE" smtClean="0"/>
+              <a:rPr lang="de-DE"/>
               <a:t>Fünfte Ebene</a:t>
             </a:r>
             <a:endParaRPr lang="de-DE" dirty="0"/>
@@ -5481,35 +5405,35 @@
           <a:p>
             <a:pPr lvl="0"/>
             <a:r>
-              <a:rPr lang="de-DE" smtClean="0"/>
+              <a:rPr lang="de-DE"/>
               <a:t>Textmasterformat bearbeiten</a:t>
             </a:r>
           </a:p>
           <a:p>
             <a:pPr lvl="1"/>
             <a:r>
-              <a:rPr lang="de-DE" smtClean="0"/>
+              <a:rPr lang="de-DE"/>
               <a:t>Zweite Ebene</a:t>
             </a:r>
           </a:p>
           <a:p>
             <a:pPr lvl="2"/>
             <a:r>
-              <a:rPr lang="de-DE" smtClean="0"/>
+              <a:rPr lang="de-DE"/>
               <a:t>Dritte Ebene</a:t>
             </a:r>
           </a:p>
           <a:p>
             <a:pPr lvl="3"/>
             <a:r>
-              <a:rPr lang="de-DE" smtClean="0"/>
+              <a:rPr lang="de-DE"/>
               <a:t>Vierte Ebene</a:t>
             </a:r>
           </a:p>
           <a:p>
             <a:pPr lvl="4"/>
             <a:r>
-              <a:rPr lang="de-DE" smtClean="0"/>
+              <a:rPr lang="de-DE"/>
               <a:t>Fünfte Ebene</a:t>
             </a:r>
             <a:endParaRPr lang="de-DE" dirty="0"/>
@@ -5609,35 +5533,35 @@
           <a:p>
             <a:pPr lvl="0"/>
             <a:r>
-              <a:rPr lang="de-DE" smtClean="0"/>
+              <a:rPr lang="de-DE"/>
               <a:t>Textmasterformat bearbeiten</a:t>
             </a:r>
           </a:p>
           <a:p>
             <a:pPr lvl="1"/>
             <a:r>
-              <a:rPr lang="de-DE" smtClean="0"/>
+              <a:rPr lang="de-DE"/>
               <a:t>Zweite Ebene</a:t>
             </a:r>
           </a:p>
           <a:p>
             <a:pPr lvl="2"/>
             <a:r>
-              <a:rPr lang="de-DE" smtClean="0"/>
+              <a:rPr lang="de-DE"/>
               <a:t>Dritte Ebene</a:t>
             </a:r>
           </a:p>
           <a:p>
             <a:pPr lvl="3"/>
             <a:r>
-              <a:rPr lang="de-DE" smtClean="0"/>
+              <a:rPr lang="de-DE"/>
               <a:t>Vierte Ebene</a:t>
             </a:r>
           </a:p>
           <a:p>
             <a:pPr lvl="4"/>
             <a:r>
-              <a:rPr lang="de-DE" smtClean="0"/>
+              <a:rPr lang="de-DE"/>
               <a:t>Fünfte Ebene</a:t>
             </a:r>
             <a:endParaRPr lang="de-DE" dirty="0"/>
@@ -5683,10 +5607,9 @@
               </a:spcBef>
             </a:pPr>
             <a:r>
-              <a:rPr lang="en-GB" smtClean="0"/>
+              <a:rPr lang="en-GB"/>
               <a:t>C4: On-the-fly Compute Center II</a:t>
             </a:r>
-            <a:endParaRPr lang="en-GB"/>
           </a:p>
         </p:txBody>
       </p:sp>
@@ -5700,13 +5623,6 @@
   <p:clrMapOvr>
     <a:masterClrMapping/>
   </p:clrMapOvr>
-  <p:timing>
-    <p:tnLst>
-      <p:par>
-        <p:cTn id="1" dur="indefinite" restart="never" nodeType="tmRoot"/>
-      </p:par>
-    </p:tnLst>
-  </p:timing>
 </p:sldLayout>
 </file>
 
@@ -5767,7 +5683,7 @@
           </a:lstStyle>
           <a:p>
             <a:r>
-              <a:rPr lang="de-DE" smtClean="0"/>
+              <a:rPr lang="de-DE"/>
               <a:t>Titelmasterformat durch Klicken bearbeiten</a:t>
             </a:r>
             <a:endParaRPr lang="de-DE" dirty="0"/>
@@ -5804,7 +5720,7 @@
           <a:lstStyle/>
           <a:p>
             <a:pPr algn="ctr"/>
-            <a:endParaRPr lang="de-DE" sz="1600" dirty="0" err="1" smtClean="0"/>
+            <a:endParaRPr lang="de-DE" sz="1600" dirty="0" err="1"/>
           </a:p>
         </p:txBody>
       </p:sp>
@@ -5840,7 +5756,7 @@
           <a:lstStyle/>
           <a:p>
             <a:pPr algn="ctr"/>
-            <a:endParaRPr lang="de-DE" sz="1600" dirty="0" err="1" smtClean="0"/>
+            <a:endParaRPr lang="de-DE" sz="1600" dirty="0" err="1"/>
           </a:p>
         </p:txBody>
       </p:sp>
@@ -5883,10 +5799,9 @@
               </a:spcBef>
             </a:pPr>
             <a:r>
-              <a:rPr lang="en-GB" smtClean="0"/>
+              <a:rPr lang="en-GB"/>
               <a:t>C4: On-the-fly Compute Center II</a:t>
             </a:r>
-            <a:endParaRPr lang="en-GB"/>
           </a:p>
         </p:txBody>
       </p:sp>
@@ -5900,13 +5815,6 @@
   <p:clrMapOvr>
     <a:masterClrMapping/>
   </p:clrMapOvr>
-  <p:timing>
-    <p:tnLst>
-      <p:par>
-        <p:cTn id="1" dur="indefinite" restart="never" nodeType="tmRoot"/>
-      </p:par>
-    </p:tnLst>
-  </p:timing>
 </p:sldLayout>
 </file>
 
@@ -6042,10 +5950,9 @@
           </a:lstStyle>
           <a:p>
             <a:r>
-              <a:rPr lang="de-DE" dirty="0" smtClean="0"/>
+              <a:rPr lang="de-DE" dirty="0"/>
               <a:t>Formatvorlage des Untertitelmasters</a:t>
             </a:r>
-            <a:endParaRPr lang="de-DE" dirty="0"/>
           </a:p>
         </p:txBody>
       </p:sp>
@@ -6083,7 +5990,7 @@
           </a:lstStyle>
           <a:p>
             <a:r>
-              <a:rPr lang="de-DE" smtClean="0"/>
+              <a:rPr lang="de-DE"/>
               <a:t>Titelmasterformat durch Klicken bearbeiten</a:t>
             </a:r>
             <a:endParaRPr lang="de-DE" dirty="0"/>
@@ -6129,13 +6036,6 @@
   <p:clrMapOvr>
     <a:masterClrMapping/>
   </p:clrMapOvr>
-  <p:timing>
-    <p:tnLst>
-      <p:par>
-        <p:cTn id="1" dur="indefinite" restart="never" nodeType="tmRoot"/>
-      </p:par>
-    </p:tnLst>
-  </p:timing>
 </p:sldLayout>
 </file>
 
@@ -6196,7 +6096,7 @@
           </a:lstStyle>
           <a:p>
             <a:r>
-              <a:rPr lang="de-DE" smtClean="0"/>
+              <a:rPr lang="de-DE"/>
               <a:t>Titelmasterformat durch Klicken bearbeiten</a:t>
             </a:r>
             <a:endParaRPr lang="de-DE" dirty="0"/>
@@ -6233,7 +6133,7 @@
           <a:lstStyle/>
           <a:p>
             <a:pPr algn="ctr"/>
-            <a:endParaRPr lang="de-DE" sz="1600" dirty="0" err="1" smtClean="0"/>
+            <a:endParaRPr lang="de-DE" sz="1600" dirty="0" err="1"/>
           </a:p>
         </p:txBody>
       </p:sp>
@@ -6269,7 +6169,7 @@
           <a:lstStyle/>
           <a:p>
             <a:pPr algn="ctr"/>
-            <a:endParaRPr lang="de-DE" sz="1600" dirty="0" err="1" smtClean="0"/>
+            <a:endParaRPr lang="de-DE" sz="1600" dirty="0" err="1"/>
           </a:p>
         </p:txBody>
       </p:sp>
@@ -6312,10 +6212,9 @@
               </a:spcBef>
             </a:pPr>
             <a:r>
-              <a:rPr lang="en-GB" smtClean="0"/>
+              <a:rPr lang="en-GB"/>
               <a:t>C4: On-the-fly Compute Center II</a:t>
             </a:r>
-            <a:endParaRPr lang="en-GB"/>
           </a:p>
         </p:txBody>
       </p:sp>
@@ -6329,13 +6228,6 @@
   <p:clrMapOvr>
     <a:masterClrMapping/>
   </p:clrMapOvr>
-  <p:timing>
-    <p:tnLst>
-      <p:par>
-        <p:cTn id="1" dur="indefinite" restart="never" nodeType="tmRoot"/>
-      </p:par>
-    </p:tnLst>
-  </p:timing>
 </p:sldLayout>
 </file>
 
@@ -6396,7 +6288,7 @@
           </a:lstStyle>
           <a:p>
             <a:r>
-              <a:rPr lang="de-DE" smtClean="0"/>
+              <a:rPr lang="de-DE"/>
               <a:t>Titelmasterformat durch Klicken bearbeiten</a:t>
             </a:r>
             <a:endParaRPr lang="de-DE" dirty="0"/>
@@ -6433,7 +6325,7 @@
           <a:lstStyle/>
           <a:p>
             <a:pPr algn="ctr"/>
-            <a:endParaRPr lang="de-DE" sz="1600" dirty="0" err="1" smtClean="0"/>
+            <a:endParaRPr lang="de-DE" sz="1600" dirty="0" err="1"/>
           </a:p>
         </p:txBody>
       </p:sp>
@@ -6485,7 +6377,7 @@
           <a:p>
             <a:pPr lvl="0"/>
             <a:r>
-              <a:rPr lang="de-DE" smtClean="0"/>
+              <a:rPr lang="de-DE"/>
               <a:t>Textmasterformat bearbeiten</a:t>
             </a:r>
           </a:p>
@@ -6523,7 +6415,7 @@
           <a:lstStyle/>
           <a:p>
             <a:pPr algn="ctr"/>
-            <a:endParaRPr lang="de-DE" sz="1600" dirty="0" err="1" smtClean="0"/>
+            <a:endParaRPr lang="de-DE" sz="1600" dirty="0" err="1"/>
           </a:p>
         </p:txBody>
       </p:sp>
@@ -6566,10 +6458,9 @@
               </a:spcBef>
             </a:pPr>
             <a:r>
-              <a:rPr lang="en-GB" smtClean="0"/>
+              <a:rPr lang="en-GB"/>
               <a:t>C4: On-the-fly Compute Center II</a:t>
             </a:r>
-            <a:endParaRPr lang="en-GB"/>
           </a:p>
         </p:txBody>
       </p:sp>
@@ -6583,13 +6474,6 @@
   <p:clrMapOvr>
     <a:masterClrMapping/>
   </p:clrMapOvr>
-  <p:timing>
-    <p:tnLst>
-      <p:par>
-        <p:cTn id="1" dur="indefinite" restart="never" nodeType="tmRoot"/>
-      </p:par>
-    </p:tnLst>
-  </p:timing>
 </p:sldLayout>
 </file>
 
@@ -6644,10 +6528,9 @@
           </a:lstStyle>
           <a:p>
             <a:r>
-              <a:rPr lang="de-DE" dirty="0" smtClean="0"/>
+              <a:rPr lang="de-DE" dirty="0"/>
               <a:t>Vielen Dank für Ihre Aufmerksamkeit</a:t>
             </a:r>
-            <a:endParaRPr lang="de-DE" dirty="0"/>
           </a:p>
         </p:txBody>
       </p:sp>
@@ -6745,41 +6628,40 @@
           </a:lstStyle>
           <a:p>
             <a:pPr lvl="0"/>
-            <a:endParaRPr lang="de-DE" dirty="0" smtClean="0"/>
+            <a:endParaRPr lang="de-DE" dirty="0"/>
           </a:p>
           <a:p>
             <a:pPr lvl="0"/>
-            <a:endParaRPr lang="de-DE" dirty="0" smtClean="0"/>
+            <a:endParaRPr lang="de-DE" dirty="0"/>
           </a:p>
           <a:p>
             <a:pPr lvl="0"/>
-            <a:endParaRPr lang="de-DE" dirty="0" smtClean="0"/>
+            <a:endParaRPr lang="de-DE" dirty="0"/>
           </a:p>
           <a:p>
             <a:pPr lvl="0"/>
             <a:r>
-              <a:rPr lang="de-DE" dirty="0" smtClean="0"/>
+              <a:rPr lang="de-DE" dirty="0"/>
               <a:t>Alexander Jungmann</a:t>
             </a:r>
           </a:p>
           <a:p>
             <a:pPr lvl="0"/>
-            <a:endParaRPr lang="de-DE" dirty="0" smtClean="0"/>
+            <a:endParaRPr lang="de-DE" dirty="0"/>
           </a:p>
           <a:p>
             <a:pPr lvl="1"/>
             <a:r>
-              <a:rPr lang="de-DE" dirty="0" smtClean="0"/>
+              <a:rPr lang="de-DE" dirty="0"/>
               <a:t>E-Mail: sfb901@uni-paderborn.de</a:t>
             </a:r>
           </a:p>
           <a:p>
             <a:pPr lvl="1"/>
             <a:r>
-              <a:rPr lang="de-DE" dirty="0" smtClean="0"/>
+              <a:rPr lang="de-DE" dirty="0"/>
               <a:t>URL:	  sfb901.upb.de</a:t>
             </a:r>
-            <a:endParaRPr lang="de-DE" dirty="0"/>
           </a:p>
         </p:txBody>
       </p:sp>
@@ -6822,10 +6704,9 @@
               </a:spcBef>
             </a:pPr>
             <a:r>
-              <a:rPr lang="en-GB" smtClean="0"/>
+              <a:rPr lang="en-GB"/>
               <a:t>C4: On-the-fly Compute Center II</a:t>
             </a:r>
-            <a:endParaRPr lang="en-GB"/>
           </a:p>
         </p:txBody>
       </p:sp>
@@ -6839,13 +6720,6 @@
   <p:clrMapOvr>
     <a:masterClrMapping/>
   </p:clrMapOvr>
-  <p:timing>
-    <p:tnLst>
-      <p:par>
-        <p:cTn id="1" dur="indefinite" restart="never" nodeType="tmRoot"/>
-      </p:par>
-    </p:tnLst>
-  </p:timing>
 </p:sldLayout>
 </file>
 
@@ -6981,10 +6855,9 @@
           </a:lstStyle>
           <a:p>
             <a:r>
-              <a:rPr lang="de-DE" dirty="0" smtClean="0"/>
+              <a:rPr lang="de-DE" dirty="0"/>
               <a:t>Formatvorlage des Untertitelmasters</a:t>
             </a:r>
-            <a:endParaRPr lang="de-DE" dirty="0"/>
           </a:p>
         </p:txBody>
       </p:sp>
@@ -7022,7 +6895,7 @@
           </a:lstStyle>
           <a:p>
             <a:r>
-              <a:rPr lang="de-DE" smtClean="0"/>
+              <a:rPr lang="de-DE"/>
               <a:t>Titelmasterformat durch Klicken bearbeiten</a:t>
             </a:r>
             <a:endParaRPr lang="de-DE" dirty="0"/>
@@ -7129,7 +7002,7 @@
           <a:p>
             <a:pPr lvl="0"/>
             <a:r>
-              <a:rPr lang="de-DE" dirty="0" smtClean="0"/>
+              <a:rPr lang="de-DE" dirty="0"/>
               <a:t>Textmasterformat bearbeiten</a:t>
             </a:r>
           </a:p>
@@ -7145,13 +7018,6 @@
   <p:clrMapOvr>
     <a:masterClrMapping/>
   </p:clrMapOvr>
-  <p:timing>
-    <p:tnLst>
-      <p:par>
-        <p:cTn id="1" dur="indefinite" restart="never" nodeType="tmRoot"/>
-      </p:par>
-    </p:tnLst>
-  </p:timing>
 </p:sldLayout>
 </file>
 
@@ -7265,35 +7131,35 @@
           <a:p>
             <a:pPr lvl="0"/>
             <a:r>
-              <a:rPr lang="de-DE" smtClean="0"/>
+              <a:rPr lang="de-DE"/>
               <a:t>Textmasterformat bearbeiten</a:t>
             </a:r>
           </a:p>
           <a:p>
             <a:pPr lvl="1"/>
             <a:r>
-              <a:rPr lang="de-DE" smtClean="0"/>
+              <a:rPr lang="de-DE"/>
               <a:t>Zweite Ebene</a:t>
             </a:r>
           </a:p>
           <a:p>
             <a:pPr lvl="2"/>
             <a:r>
-              <a:rPr lang="de-DE" smtClean="0"/>
+              <a:rPr lang="de-DE"/>
               <a:t>Dritte Ebene</a:t>
             </a:r>
           </a:p>
           <a:p>
             <a:pPr lvl="3"/>
             <a:r>
-              <a:rPr lang="de-DE" smtClean="0"/>
+              <a:rPr lang="de-DE"/>
               <a:t>Vierte Ebene</a:t>
             </a:r>
           </a:p>
           <a:p>
             <a:pPr lvl="4"/>
             <a:r>
-              <a:rPr lang="de-DE" smtClean="0"/>
+              <a:rPr lang="de-DE"/>
               <a:t>Fünfte Ebene</a:t>
             </a:r>
             <a:endParaRPr lang="de-DE" dirty="0"/>
@@ -7340,7 +7206,7 @@
           </a:lstStyle>
           <a:p>
             <a:r>
-              <a:rPr lang="de-DE" smtClean="0"/>
+              <a:rPr lang="de-DE"/>
               <a:t>Titelmasterformat durch Klicken bearbeiten</a:t>
             </a:r>
             <a:endParaRPr lang="de-DE" dirty="0"/>
@@ -7377,7 +7243,7 @@
           <a:lstStyle/>
           <a:p>
             <a:pPr algn="ctr"/>
-            <a:endParaRPr lang="de-DE" sz="1600" dirty="0" err="1" smtClean="0"/>
+            <a:endParaRPr lang="de-DE" sz="1600" dirty="0" err="1"/>
           </a:p>
         </p:txBody>
       </p:sp>
@@ -7413,7 +7279,7 @@
           <a:lstStyle/>
           <a:p>
             <a:pPr algn="ctr"/>
-            <a:endParaRPr lang="de-DE" sz="1600" dirty="0" err="1" smtClean="0"/>
+            <a:endParaRPr lang="de-DE" sz="1600" dirty="0" err="1"/>
           </a:p>
         </p:txBody>
       </p:sp>
@@ -7456,10 +7322,9 @@
               </a:spcBef>
             </a:pPr>
             <a:r>
-              <a:rPr lang="en-GB" smtClean="0"/>
+              <a:rPr lang="en-GB"/>
               <a:t>C4: On-the-fly Compute Center II</a:t>
             </a:r>
-            <a:endParaRPr lang="en-GB"/>
           </a:p>
         </p:txBody>
       </p:sp>
@@ -7473,13 +7338,6 @@
   <p:clrMapOvr>
     <a:masterClrMapping/>
   </p:clrMapOvr>
-  <p:timing>
-    <p:tnLst>
-      <p:par>
-        <p:cTn id="1" dur="indefinite" restart="never" nodeType="tmRoot"/>
-      </p:par>
-    </p:tnLst>
-  </p:timing>
 </p:sldLayout>
 </file>
 
@@ -7593,35 +7451,35 @@
           <a:p>
             <a:pPr lvl="0"/>
             <a:r>
-              <a:rPr lang="de-DE" smtClean="0"/>
+              <a:rPr lang="de-DE"/>
               <a:t>Textmasterformat bearbeiten</a:t>
             </a:r>
           </a:p>
           <a:p>
             <a:pPr lvl="1"/>
             <a:r>
-              <a:rPr lang="de-DE" smtClean="0"/>
+              <a:rPr lang="de-DE"/>
               <a:t>Zweite Ebene</a:t>
             </a:r>
           </a:p>
           <a:p>
             <a:pPr lvl="2"/>
             <a:r>
-              <a:rPr lang="de-DE" smtClean="0"/>
+              <a:rPr lang="de-DE"/>
               <a:t>Dritte Ebene</a:t>
             </a:r>
           </a:p>
           <a:p>
             <a:pPr lvl="3"/>
             <a:r>
-              <a:rPr lang="de-DE" smtClean="0"/>
+              <a:rPr lang="de-DE"/>
               <a:t>Vierte Ebene</a:t>
             </a:r>
           </a:p>
           <a:p>
             <a:pPr lvl="4"/>
             <a:r>
-              <a:rPr lang="de-DE" smtClean="0"/>
+              <a:rPr lang="de-DE"/>
               <a:t>Fünfte Ebene</a:t>
             </a:r>
             <a:endParaRPr lang="de-DE" dirty="0"/>
@@ -7668,7 +7526,7 @@
           </a:lstStyle>
           <a:p>
             <a:r>
-              <a:rPr lang="de-DE" smtClean="0"/>
+              <a:rPr lang="de-DE"/>
               <a:t>Titelmasterformat durch Klicken bearbeiten</a:t>
             </a:r>
             <a:endParaRPr lang="de-DE" dirty="0"/>
@@ -7705,7 +7563,7 @@
           <a:lstStyle/>
           <a:p>
             <a:pPr algn="ctr"/>
-            <a:endParaRPr lang="de-DE" sz="1600" dirty="0" err="1" smtClean="0"/>
+            <a:endParaRPr lang="de-DE" sz="1600" dirty="0" err="1"/>
           </a:p>
         </p:txBody>
       </p:sp>
@@ -7741,7 +7599,7 @@
           <a:lstStyle/>
           <a:p>
             <a:pPr algn="ctr"/>
-            <a:endParaRPr lang="de-DE" sz="1600" dirty="0" err="1" smtClean="0"/>
+            <a:endParaRPr lang="de-DE" sz="1600" dirty="0" err="1"/>
           </a:p>
         </p:txBody>
       </p:sp>
@@ -7784,10 +7642,9 @@
               </a:spcBef>
             </a:pPr>
             <a:r>
-              <a:rPr lang="en-GB" smtClean="0"/>
+              <a:rPr lang="en-GB"/>
               <a:t>C4: On-the-fly Compute Center II</a:t>
             </a:r>
-            <a:endParaRPr lang="en-GB"/>
           </a:p>
         </p:txBody>
       </p:sp>
@@ -7801,13 +7658,6 @@
   <p:clrMapOvr>
     <a:masterClrMapping/>
   </p:clrMapOvr>
-  <p:timing>
-    <p:tnLst>
-      <p:par>
-        <p:cTn id="1" dur="indefinite" restart="never" nodeType="tmRoot"/>
-      </p:par>
-    </p:tnLst>
-  </p:timing>
 </p:sldLayout>
 </file>
 
@@ -7868,7 +7718,7 @@
           </a:lstStyle>
           <a:p>
             <a:r>
-              <a:rPr lang="de-DE" smtClean="0"/>
+              <a:rPr lang="de-DE"/>
               <a:t>Titelmasterformat durch Klicken bearbeiten</a:t>
             </a:r>
             <a:endParaRPr lang="de-DE" dirty="0"/>
@@ -7905,7 +7755,7 @@
           <a:lstStyle/>
           <a:p>
             <a:pPr algn="ctr"/>
-            <a:endParaRPr lang="de-DE" sz="1600" dirty="0" err="1" smtClean="0"/>
+            <a:endParaRPr lang="de-DE" sz="1600" dirty="0" err="1"/>
           </a:p>
         </p:txBody>
       </p:sp>
@@ -7957,7 +7807,7 @@
           <a:p>
             <a:pPr lvl="0"/>
             <a:r>
-              <a:rPr lang="de-DE" smtClean="0"/>
+              <a:rPr lang="de-DE"/>
               <a:t>Textmasterformat bearbeiten</a:t>
             </a:r>
           </a:p>
@@ -7995,7 +7845,7 @@
           <a:lstStyle/>
           <a:p>
             <a:pPr algn="ctr"/>
-            <a:endParaRPr lang="de-DE" sz="1600" dirty="0" err="1" smtClean="0"/>
+            <a:endParaRPr lang="de-DE" sz="1600" dirty="0" err="1"/>
           </a:p>
         </p:txBody>
       </p:sp>
@@ -8092,35 +7942,35 @@
           <a:p>
             <a:pPr lvl="0"/>
             <a:r>
-              <a:rPr lang="de-DE" smtClean="0"/>
+              <a:rPr lang="de-DE"/>
               <a:t>Textmasterformat bearbeiten</a:t>
             </a:r>
           </a:p>
           <a:p>
             <a:pPr lvl="1"/>
             <a:r>
-              <a:rPr lang="de-DE" smtClean="0"/>
+              <a:rPr lang="de-DE"/>
               <a:t>Zweite Ebene</a:t>
             </a:r>
           </a:p>
           <a:p>
             <a:pPr lvl="2"/>
             <a:r>
-              <a:rPr lang="de-DE" smtClean="0"/>
+              <a:rPr lang="de-DE"/>
               <a:t>Dritte Ebene</a:t>
             </a:r>
           </a:p>
           <a:p>
             <a:pPr lvl="3"/>
             <a:r>
-              <a:rPr lang="de-DE" smtClean="0"/>
+              <a:rPr lang="de-DE"/>
               <a:t>Vierte Ebene</a:t>
             </a:r>
           </a:p>
           <a:p>
             <a:pPr lvl="4"/>
             <a:r>
-              <a:rPr lang="de-DE" smtClean="0"/>
+              <a:rPr lang="de-DE"/>
               <a:t>Fünfte Ebene</a:t>
             </a:r>
             <a:endParaRPr lang="de-DE" dirty="0"/>
@@ -8166,10 +8016,9 @@
               </a:spcBef>
             </a:pPr>
             <a:r>
-              <a:rPr lang="en-GB" smtClean="0"/>
+              <a:rPr lang="en-GB"/>
               <a:t>C4: On-the-fly Compute Center II</a:t>
             </a:r>
-            <a:endParaRPr lang="en-GB"/>
           </a:p>
         </p:txBody>
       </p:sp>
@@ -8183,13 +8032,6 @@
   <p:clrMapOvr>
     <a:masterClrMapping/>
   </p:clrMapOvr>
-  <p:timing>
-    <p:tnLst>
-      <p:par>
-        <p:cTn id="1" dur="indefinite" restart="never" nodeType="tmRoot"/>
-      </p:par>
-    </p:tnLst>
-  </p:timing>
 </p:sldLayout>
 </file>
 
@@ -8303,35 +8145,35 @@
           <a:p>
             <a:pPr lvl="0"/>
             <a:r>
-              <a:rPr lang="de-DE" smtClean="0"/>
+              <a:rPr lang="de-DE"/>
               <a:t>Textmasterformat bearbeiten</a:t>
             </a:r>
           </a:p>
           <a:p>
             <a:pPr lvl="1"/>
             <a:r>
-              <a:rPr lang="de-DE" smtClean="0"/>
+              <a:rPr lang="de-DE"/>
               <a:t>Zweite Ebene</a:t>
             </a:r>
           </a:p>
           <a:p>
             <a:pPr lvl="2"/>
             <a:r>
-              <a:rPr lang="de-DE" smtClean="0"/>
+              <a:rPr lang="de-DE"/>
               <a:t>Dritte Ebene</a:t>
             </a:r>
           </a:p>
           <a:p>
             <a:pPr lvl="3"/>
             <a:r>
-              <a:rPr lang="de-DE" smtClean="0"/>
+              <a:rPr lang="de-DE"/>
               <a:t>Vierte Ebene</a:t>
             </a:r>
           </a:p>
           <a:p>
             <a:pPr lvl="4"/>
             <a:r>
-              <a:rPr lang="de-DE" smtClean="0"/>
+              <a:rPr lang="de-DE"/>
               <a:t>Fünfte Ebene</a:t>
             </a:r>
             <a:endParaRPr lang="de-DE" dirty="0"/>
@@ -8431,35 +8273,35 @@
           <a:p>
             <a:pPr lvl="0"/>
             <a:r>
-              <a:rPr lang="de-DE" smtClean="0"/>
+              <a:rPr lang="de-DE"/>
               <a:t>Textmasterformat bearbeiten</a:t>
             </a:r>
           </a:p>
           <a:p>
             <a:pPr lvl="1"/>
             <a:r>
-              <a:rPr lang="de-DE" smtClean="0"/>
+              <a:rPr lang="de-DE"/>
               <a:t>Zweite Ebene</a:t>
             </a:r>
           </a:p>
           <a:p>
             <a:pPr lvl="2"/>
             <a:r>
-              <a:rPr lang="de-DE" smtClean="0"/>
+              <a:rPr lang="de-DE"/>
               <a:t>Dritte Ebene</a:t>
             </a:r>
           </a:p>
           <a:p>
             <a:pPr lvl="3"/>
             <a:r>
-              <a:rPr lang="de-DE" smtClean="0"/>
+              <a:rPr lang="de-DE"/>
               <a:t>Vierte Ebene</a:t>
             </a:r>
           </a:p>
           <a:p>
             <a:pPr lvl="4"/>
             <a:r>
-              <a:rPr lang="de-DE" smtClean="0"/>
+              <a:rPr lang="de-DE"/>
               <a:t>Fünfte Ebene</a:t>
             </a:r>
             <a:endParaRPr lang="de-DE" dirty="0"/>
@@ -8506,7 +8348,7 @@
           </a:lstStyle>
           <a:p>
             <a:r>
-              <a:rPr lang="de-DE" smtClean="0"/>
+              <a:rPr lang="de-DE"/>
               <a:t>Titelmasterformat durch Klicken bearbeiten</a:t>
             </a:r>
             <a:endParaRPr lang="de-DE" dirty="0"/>
@@ -8543,7 +8385,7 @@
           <a:lstStyle/>
           <a:p>
             <a:pPr algn="ctr"/>
-            <a:endParaRPr lang="de-DE" sz="1600" dirty="0" err="1" smtClean="0"/>
+            <a:endParaRPr lang="de-DE" sz="1600" dirty="0" err="1"/>
           </a:p>
         </p:txBody>
       </p:sp>
@@ -8579,7 +8421,7 @@
           <a:lstStyle/>
           <a:p>
             <a:pPr algn="ctr"/>
-            <a:endParaRPr lang="de-DE" sz="1600" dirty="0" err="1" smtClean="0"/>
+            <a:endParaRPr lang="de-DE" sz="1600" dirty="0" err="1"/>
           </a:p>
         </p:txBody>
       </p:sp>
@@ -8622,10 +8464,9 @@
               </a:spcBef>
             </a:pPr>
             <a:r>
-              <a:rPr lang="en-GB" smtClean="0"/>
+              <a:rPr lang="en-GB"/>
               <a:t>C4: On-the-fly Compute Center II</a:t>
             </a:r>
-            <a:endParaRPr lang="en-GB"/>
           </a:p>
         </p:txBody>
       </p:sp>
@@ -8639,13 +8480,6 @@
   <p:clrMapOvr>
     <a:masterClrMapping/>
   </p:clrMapOvr>
-  <p:timing>
-    <p:tnLst>
-      <p:par>
-        <p:cTn id="1" dur="indefinite" restart="never" nodeType="tmRoot"/>
-      </p:par>
-    </p:tnLst>
-  </p:timing>
 </p:sldLayout>
 </file>
 
@@ -8759,35 +8593,35 @@
           <a:p>
             <a:pPr lvl="0"/>
             <a:r>
-              <a:rPr lang="de-DE" smtClean="0"/>
+              <a:rPr lang="de-DE"/>
               <a:t>Textmasterformat bearbeiten</a:t>
             </a:r>
           </a:p>
           <a:p>
             <a:pPr lvl="1"/>
             <a:r>
-              <a:rPr lang="de-DE" smtClean="0"/>
+              <a:rPr lang="de-DE"/>
               <a:t>Zweite Ebene</a:t>
             </a:r>
           </a:p>
           <a:p>
             <a:pPr lvl="2"/>
             <a:r>
-              <a:rPr lang="de-DE" smtClean="0"/>
+              <a:rPr lang="de-DE"/>
               <a:t>Dritte Ebene</a:t>
             </a:r>
           </a:p>
           <a:p>
             <a:pPr lvl="3"/>
             <a:r>
-              <a:rPr lang="de-DE" smtClean="0"/>
+              <a:rPr lang="de-DE"/>
               <a:t>Vierte Ebene</a:t>
             </a:r>
           </a:p>
           <a:p>
             <a:pPr lvl="4"/>
             <a:r>
-              <a:rPr lang="de-DE" smtClean="0"/>
+              <a:rPr lang="de-DE"/>
               <a:t>Fünfte Ebene</a:t>
             </a:r>
             <a:endParaRPr lang="de-DE" dirty="0"/>
@@ -8834,7 +8668,7 @@
           </a:lstStyle>
           <a:p>
             <a:r>
-              <a:rPr lang="de-DE" smtClean="0"/>
+              <a:rPr lang="de-DE"/>
               <a:t>Titelmasterformat durch Klicken bearbeiten</a:t>
             </a:r>
             <a:endParaRPr lang="de-DE" dirty="0"/>
@@ -8871,7 +8705,7 @@
           <a:lstStyle/>
           <a:p>
             <a:pPr algn="ctr"/>
-            <a:endParaRPr lang="de-DE" sz="1600" dirty="0" err="1" smtClean="0"/>
+            <a:endParaRPr lang="de-DE" sz="1600" dirty="0" err="1"/>
           </a:p>
         </p:txBody>
       </p:sp>
@@ -8907,7 +8741,7 @@
           <a:lstStyle/>
           <a:p>
             <a:pPr algn="ctr"/>
-            <a:endParaRPr lang="de-DE" sz="1600" dirty="0" err="1" smtClean="0"/>
+            <a:endParaRPr lang="de-DE" sz="1600" dirty="0" err="1"/>
           </a:p>
         </p:txBody>
       </p:sp>
@@ -9004,35 +8838,35 @@
           <a:p>
             <a:pPr lvl="0"/>
             <a:r>
-              <a:rPr lang="de-DE" smtClean="0"/>
+              <a:rPr lang="de-DE"/>
               <a:t>Textmasterformat bearbeiten</a:t>
             </a:r>
           </a:p>
           <a:p>
             <a:pPr lvl="1"/>
             <a:r>
-              <a:rPr lang="de-DE" smtClean="0"/>
+              <a:rPr lang="de-DE"/>
               <a:t>Zweite Ebene</a:t>
             </a:r>
           </a:p>
           <a:p>
             <a:pPr lvl="2"/>
             <a:r>
-              <a:rPr lang="de-DE" smtClean="0"/>
+              <a:rPr lang="de-DE"/>
               <a:t>Dritte Ebene</a:t>
             </a:r>
           </a:p>
           <a:p>
             <a:pPr lvl="3"/>
             <a:r>
-              <a:rPr lang="de-DE" smtClean="0"/>
+              <a:rPr lang="de-DE"/>
               <a:t>Vierte Ebene</a:t>
             </a:r>
           </a:p>
           <a:p>
             <a:pPr lvl="4"/>
             <a:r>
-              <a:rPr lang="de-DE" smtClean="0"/>
+              <a:rPr lang="de-DE"/>
               <a:t>Fünfte Ebene</a:t>
             </a:r>
             <a:endParaRPr lang="de-DE" dirty="0"/>
@@ -9078,10 +8912,9 @@
               </a:spcBef>
             </a:pPr>
             <a:r>
-              <a:rPr lang="en-GB" smtClean="0"/>
+              <a:rPr lang="en-GB"/>
               <a:t>C4: On-the-fly Compute Center II</a:t>
             </a:r>
-            <a:endParaRPr lang="en-GB"/>
           </a:p>
         </p:txBody>
       </p:sp>
@@ -9095,13 +8928,6 @@
   <p:clrMapOvr>
     <a:masterClrMapping/>
   </p:clrMapOvr>
-  <p:timing>
-    <p:tnLst>
-      <p:par>
-        <p:cTn id="1" dur="indefinite" restart="never" nodeType="tmRoot"/>
-      </p:par>
-    </p:tnLst>
-  </p:timing>
 </p:sldLayout>
 </file>
 
@@ -9162,7 +8988,7 @@
           </a:lstStyle>
           <a:p>
             <a:r>
-              <a:rPr lang="de-DE" smtClean="0"/>
+              <a:rPr lang="de-DE"/>
               <a:t>Titelmasterformat durch Klicken bearbeiten</a:t>
             </a:r>
             <a:endParaRPr lang="de-DE" dirty="0"/>
@@ -9199,7 +9025,7 @@
           <a:lstStyle/>
           <a:p>
             <a:pPr algn="ctr"/>
-            <a:endParaRPr lang="de-DE" sz="1600" dirty="0" err="1" smtClean="0"/>
+            <a:endParaRPr lang="de-DE" sz="1600" dirty="0" err="1"/>
           </a:p>
         </p:txBody>
       </p:sp>
@@ -9251,7 +9077,7 @@
           <a:p>
             <a:pPr lvl="0"/>
             <a:r>
-              <a:rPr lang="de-DE" smtClean="0"/>
+              <a:rPr lang="de-DE"/>
               <a:t>Textmasterformat bearbeiten</a:t>
             </a:r>
           </a:p>
@@ -9289,7 +9115,7 @@
           <a:lstStyle/>
           <a:p>
             <a:pPr algn="ctr"/>
-            <a:endParaRPr lang="de-DE" sz="1600" dirty="0" err="1" smtClean="0"/>
+            <a:endParaRPr lang="de-DE" sz="1600" dirty="0" err="1"/>
           </a:p>
         </p:txBody>
       </p:sp>
@@ -9386,35 +9212,35 @@
           <a:p>
             <a:pPr lvl="0"/>
             <a:r>
-              <a:rPr lang="de-DE" smtClean="0"/>
+              <a:rPr lang="de-DE"/>
               <a:t>Textmasterformat bearbeiten</a:t>
             </a:r>
           </a:p>
           <a:p>
             <a:pPr lvl="1"/>
             <a:r>
-              <a:rPr lang="de-DE" smtClean="0"/>
+              <a:rPr lang="de-DE"/>
               <a:t>Zweite Ebene</a:t>
             </a:r>
           </a:p>
           <a:p>
             <a:pPr lvl="2"/>
             <a:r>
-              <a:rPr lang="de-DE" smtClean="0"/>
+              <a:rPr lang="de-DE"/>
               <a:t>Dritte Ebene</a:t>
             </a:r>
           </a:p>
           <a:p>
             <a:pPr lvl="3"/>
             <a:r>
-              <a:rPr lang="de-DE" smtClean="0"/>
+              <a:rPr lang="de-DE"/>
               <a:t>Vierte Ebene</a:t>
             </a:r>
           </a:p>
           <a:p>
             <a:pPr lvl="4"/>
             <a:r>
-              <a:rPr lang="de-DE" smtClean="0"/>
+              <a:rPr lang="de-DE"/>
               <a:t>Fünfte Ebene</a:t>
             </a:r>
             <a:endParaRPr lang="de-DE" dirty="0"/>
@@ -9514,35 +9340,35 @@
           <a:p>
             <a:pPr lvl="0"/>
             <a:r>
-              <a:rPr lang="de-DE" smtClean="0"/>
+              <a:rPr lang="de-DE"/>
               <a:t>Textmasterformat bearbeiten</a:t>
             </a:r>
           </a:p>
           <a:p>
             <a:pPr lvl="1"/>
             <a:r>
-              <a:rPr lang="de-DE" smtClean="0"/>
+              <a:rPr lang="de-DE"/>
               <a:t>Zweite Ebene</a:t>
             </a:r>
           </a:p>
           <a:p>
             <a:pPr lvl="2"/>
             <a:r>
-              <a:rPr lang="de-DE" smtClean="0"/>
+              <a:rPr lang="de-DE"/>
               <a:t>Dritte Ebene</a:t>
             </a:r>
           </a:p>
           <a:p>
             <a:pPr lvl="3"/>
             <a:r>
-              <a:rPr lang="de-DE" smtClean="0"/>
+              <a:rPr lang="de-DE"/>
               <a:t>Vierte Ebene</a:t>
             </a:r>
           </a:p>
           <a:p>
             <a:pPr lvl="4"/>
             <a:r>
-              <a:rPr lang="de-DE" smtClean="0"/>
+              <a:rPr lang="de-DE"/>
               <a:t>Fünfte Ebene</a:t>
             </a:r>
             <a:endParaRPr lang="de-DE" dirty="0"/>
@@ -9588,10 +9414,9 @@
               </a:spcBef>
             </a:pPr>
             <a:r>
-              <a:rPr lang="en-GB" smtClean="0"/>
+              <a:rPr lang="en-GB"/>
               <a:t>C4: On-the-fly Compute Center II</a:t>
             </a:r>
-            <a:endParaRPr lang="en-GB"/>
           </a:p>
         </p:txBody>
       </p:sp>
@@ -9605,13 +9430,6 @@
   <p:clrMapOvr>
     <a:masterClrMapping/>
   </p:clrMapOvr>
-  <p:timing>
-    <p:tnLst>
-      <p:par>
-        <p:cTn id="1" dur="indefinite" restart="never" nodeType="tmRoot"/>
-      </p:par>
-    </p:tnLst>
-  </p:timing>
 </p:sldLayout>
 </file>
 
@@ -9756,7 +9574,7 @@
           <a:lstStyle/>
           <a:p>
             <a:pPr algn="ctr"/>
-            <a:endParaRPr lang="de-DE" sz="1600" dirty="0" err="1" smtClean="0"/>
+            <a:endParaRPr lang="de-DE" sz="1600" dirty="0" err="1"/>
           </a:p>
         </p:txBody>
       </p:sp>
@@ -9792,7 +9610,7 @@
           <a:lstStyle/>
           <a:p>
             <a:pPr algn="ctr"/>
-            <a:endParaRPr lang="de-DE" sz="1600" dirty="0" err="1" smtClean="0"/>
+            <a:endParaRPr lang="de-DE" sz="1600" dirty="0" err="1"/>
           </a:p>
         </p:txBody>
       </p:sp>
@@ -10010,7 +9828,7 @@
               <a:t>‹#›</a:t>
             </a:fld>
             <a:r>
-              <a:rPr lang="de-DE" sz="1200" b="0" dirty="0" smtClean="0">
+              <a:rPr lang="de-DE" sz="1200" b="0" dirty="0">
                 <a:solidFill>
                   <a:schemeClr val="accent2"/>
                 </a:solidFill>
@@ -10067,10 +9885,9 @@
               </a:spcBef>
             </a:pPr>
             <a:r>
-              <a:rPr lang="en-GB" smtClean="0"/>
+              <a:rPr lang="en-GB"/>
               <a:t>C4: On-the-fly Compute Center II</a:t>
             </a:r>
-            <a:endParaRPr lang="en-GB"/>
           </a:p>
         </p:txBody>
       </p:sp>
@@ -10101,13 +9918,6 @@
     <p:sldLayoutId id="2147484107" r:id="rId21"/>
     <p:sldLayoutId id="2147484084" r:id="rId22"/>
   </p:sldLayoutIdLst>
-  <p:timing>
-    <p:tnLst>
-      <p:par>
-        <p:cTn id="1" dur="indefinite" restart="never" nodeType="tmRoot"/>
-      </p:par>
-    </p:tnLst>
-  </p:timing>
   <p:hf sldNum="0" hdr="0" dt="0"/>
   <p:txStyles>
     <p:titleStyle>
@@ -10518,16 +10328,20 @@
             <p:ph type="subTitle" idx="1"/>
           </p:nvPr>
         </p:nvSpPr>
-        <p:spPr/>
+        <p:spPr>
+          <a:xfrm>
+            <a:off x="264860" y="4437000"/>
+            <a:ext cx="6128140" cy="365124"/>
+          </a:xfrm>
+        </p:spPr>
         <p:txBody>
           <a:bodyPr/>
           <a:lstStyle/>
           <a:p>
             <a:r>
-              <a:rPr lang="en-US" dirty="0" smtClean="0"/>
-              <a:t>Manuel Peuster</a:t>
-            </a:r>
-            <a:endParaRPr lang="en-US" dirty="0"/>
+              <a:rPr lang="en-US" dirty="0"/>
+              <a:t>Manuel Peuster, Stefan Schneider, Holger Karl</a:t>
+            </a:r>
           </a:p>
         </p:txBody>
       </p:sp>
@@ -10547,10 +10361,9 @@
           <a:lstStyle/>
           <a:p>
             <a:r>
-              <a:rPr lang="en-US" dirty="0" smtClean="0"/>
-              <a:t>Rapid Prototyping of OTF Services</a:t>
-            </a:r>
-            <a:endParaRPr lang="en-US" dirty="0"/>
+              <a:rPr lang="en-US" dirty="0"/>
+              <a:t>Rapid Prototyping of OTF Scenarios</a:t>
+            </a:r>
           </a:p>
         </p:txBody>
       </p:sp>
@@ -10570,10 +10383,9 @@
           <a:lstStyle/>
           <a:p>
             <a:r>
-              <a:rPr lang="en-US" dirty="0" smtClean="0"/>
+              <a:rPr lang="en-US" dirty="0"/>
               <a:t>Local Emulation of Distributed OTF Infrastructure</a:t>
             </a:r>
-            <a:endParaRPr lang="en-US" dirty="0"/>
           </a:p>
         </p:txBody>
       </p:sp>
@@ -10603,18 +10415,17 @@
               </a:spcBef>
             </a:pPr>
             <a:r>
-              <a:rPr lang="en-GB" dirty="0" smtClean="0"/>
+              <a:rPr lang="en-GB" dirty="0"/>
               <a:t>C4: On-the-fly Compute </a:t>
             </a:r>
             <a:r>
-              <a:rPr lang="en-GB" dirty="0" err="1" smtClean="0"/>
+              <a:rPr lang="en-GB" dirty="0" err="1"/>
               <a:t>Center</a:t>
             </a:r>
             <a:r>
-              <a:rPr lang="en-GB" dirty="0" smtClean="0"/>
+              <a:rPr lang="en-GB" dirty="0"/>
               <a:t> II</a:t>
             </a:r>
-            <a:endParaRPr lang="en-GB" dirty="0"/>
           </a:p>
         </p:txBody>
       </p:sp>
@@ -10628,13 +10439,6 @@
   <p:clrMapOvr>
     <a:masterClrMapping/>
   </p:clrMapOvr>
-  <p:timing>
-    <p:tnLst>
-      <p:par>
-        <p:cTn id="1" dur="indefinite" restart="never" nodeType="tmRoot"/>
-      </p:par>
-    </p:tnLst>
-  </p:timing>
 </p:sld>
 </file>
 
@@ -10676,7 +10480,7 @@
               </a:lnSpc>
             </a:pPr>
             <a:r>
-              <a:rPr lang="en-US" dirty="0" smtClean="0"/>
+              <a:rPr lang="en-US" dirty="0"/>
               <a:t>On-boarding of composed OTF service</a:t>
             </a:r>
           </a:p>
@@ -10687,7 +10491,7 @@
               </a:lnSpc>
             </a:pPr>
             <a:r>
-              <a:rPr lang="en-US" dirty="0" smtClean="0"/>
+              <a:rPr lang="en-US" dirty="0"/>
               <a:t>Instantiation through Open Source MANO</a:t>
             </a:r>
           </a:p>
@@ -10699,11 +10503,7 @@
             </a:pPr>
             <a:r>
               <a:rPr lang="en-US" dirty="0"/>
-              <a:t>Deployment on emulated distributed OTF </a:t>
-            </a:r>
-            <a:r>
-              <a:rPr lang="en-US" dirty="0" smtClean="0"/>
-              <a:t>infrastructure</a:t>
+              <a:t>Deployment on emulated distributed OTF infrastructure</a:t>
             </a:r>
           </a:p>
           <a:p>
@@ -10713,10 +10513,9 @@
               </a:lnSpc>
             </a:pPr>
             <a:r>
-              <a:rPr lang="en-US" dirty="0" smtClean="0"/>
+              <a:rPr lang="en-US" dirty="0"/>
               <a:t>Live interaction with running service</a:t>
             </a:r>
-            <a:endParaRPr lang="en-US" dirty="0"/>
           </a:p>
         </p:txBody>
       </p:sp>
@@ -10736,7 +10535,7 @@
           <a:lstStyle/>
           <a:p>
             <a:r>
-              <a:rPr lang="en-US" smtClean="0"/>
+              <a:rPr lang="en-US"/>
               <a:t>Demo workflow</a:t>
             </a:r>
             <a:endParaRPr lang="en-US" dirty="0"/>
@@ -10764,10 +10563,9 @@
               </a:spcBef>
             </a:pPr>
             <a:r>
-              <a:rPr lang="en-GB" smtClean="0"/>
+              <a:rPr lang="en-GB"/>
               <a:t>C4: On-the-fly Compute Center II</a:t>
             </a:r>
-            <a:endParaRPr lang="en-GB"/>
           </a:p>
         </p:txBody>
       </p:sp>
@@ -10811,13 +10609,6 @@
   <p:clrMapOvr>
     <a:masterClrMapping/>
   </p:clrMapOvr>
-  <p:timing>
-    <p:tnLst>
-      <p:par>
-        <p:cTn id="1" dur="indefinite" restart="never" nodeType="tmRoot"/>
-      </p:par>
-    </p:tnLst>
-  </p:timing>
 </p:sld>
 </file>
 
@@ -10873,18 +10664,17 @@
           <a:lstStyle/>
           <a:p>
             <a:r>
-              <a:rPr lang="en-US" dirty="0" smtClean="0"/>
+              <a:rPr lang="en-US" dirty="0"/>
               <a:t>Demo OTF service (</a:t>
             </a:r>
             <a:r>
-              <a:rPr lang="en-US" dirty="0" err="1" smtClean="0"/>
+              <a:rPr lang="en-US" dirty="0" err="1"/>
               <a:t>vCDN</a:t>
             </a:r>
             <a:r>
-              <a:rPr lang="en-US" dirty="0" smtClean="0"/>
+              <a:rPr lang="en-US" dirty="0"/>
               <a:t> like)</a:t>
             </a:r>
-            <a:endParaRPr lang="en-US" dirty="0"/>
           </a:p>
         </p:txBody>
       </p:sp>
@@ -10909,10 +10699,9 @@
               </a:spcBef>
             </a:pPr>
             <a:r>
-              <a:rPr lang="en-GB" smtClean="0"/>
+              <a:rPr lang="en-GB"/>
               <a:t>C4: On-the-fly Compute Center II</a:t>
             </a:r>
-            <a:endParaRPr lang="en-GB"/>
           </a:p>
         </p:txBody>
       </p:sp>
@@ -10956,13 +10745,6 @@
   <p:clrMapOvr>
     <a:masterClrMapping/>
   </p:clrMapOvr>
-  <p:timing>
-    <p:tnLst>
-      <p:par>
-        <p:cTn id="1" dur="indefinite" restart="never" nodeType="tmRoot"/>
-      </p:par>
-    </p:tnLst>
-  </p:timing>
 </p:sld>
 </file>
 
@@ -11018,10 +10800,9 @@
           <a:lstStyle/>
           <a:p>
             <a:r>
-              <a:rPr lang="en-US" sz="6000" dirty="0" smtClean="0"/>
+              <a:rPr lang="en-US" sz="6000" dirty="0"/>
               <a:t>Demo</a:t>
             </a:r>
-            <a:endParaRPr lang="en-US" sz="6000" dirty="0"/>
           </a:p>
         </p:txBody>
       </p:sp>
@@ -11035,13 +10816,6 @@
   <p:clrMapOvr>
     <a:masterClrMapping/>
   </p:clrMapOvr>
-  <p:timing>
-    <p:tnLst>
-      <p:par>
-        <p:cTn id="1" dur="indefinite" restart="never" nodeType="tmRoot"/>
-      </p:par>
-    </p:tnLst>
-  </p:timing>
 </p:sld>
 </file>
 
@@ -11097,10 +10871,9 @@
           <a:lstStyle/>
           <a:p>
             <a:r>
-              <a:rPr lang="en-US" dirty="0" smtClean="0"/>
+              <a:rPr lang="en-US" dirty="0"/>
               <a:t>Service on-boarding</a:t>
             </a:r>
-            <a:endParaRPr lang="en-US" dirty="0"/>
           </a:p>
         </p:txBody>
       </p:sp>
@@ -11114,13 +10887,6 @@
   <p:clrMapOvr>
     <a:masterClrMapping/>
   </p:clrMapOvr>
-  <p:timing>
-    <p:tnLst>
-      <p:par>
-        <p:cTn id="1" dur="indefinite" restart="never" nodeType="tmRoot"/>
-      </p:par>
-    </p:tnLst>
-  </p:timing>
 </p:sld>
 </file>
 
@@ -11176,10 +10942,9 @@
           <a:lstStyle/>
           <a:p>
             <a:r>
-              <a:rPr lang="en-US" dirty="0" smtClean="0"/>
+              <a:rPr lang="en-US" dirty="0"/>
               <a:t>Service instantiation</a:t>
             </a:r>
-            <a:endParaRPr lang="en-US" dirty="0"/>
           </a:p>
         </p:txBody>
       </p:sp>
@@ -11193,13 +10958,6 @@
   <p:clrMapOvr>
     <a:masterClrMapping/>
   </p:clrMapOvr>
-  <p:timing>
-    <p:tnLst>
-      <p:par>
-        <p:cTn id="1" dur="indefinite" restart="never" nodeType="tmRoot"/>
-      </p:par>
-    </p:tnLst>
-  </p:timing>
 </p:sld>
 </file>
 
@@ -11255,10 +11013,9 @@
           <a:lstStyle/>
           <a:p>
             <a:r>
-              <a:rPr lang="en-US" dirty="0" smtClean="0"/>
+              <a:rPr lang="en-US" dirty="0"/>
               <a:t>Live interaction with service</a:t>
             </a:r>
-            <a:endParaRPr lang="en-US" dirty="0"/>
           </a:p>
         </p:txBody>
       </p:sp>
@@ -11272,13 +11029,6 @@
   <p:clrMapOvr>
     <a:masterClrMapping/>
   </p:clrMapOvr>
-  <p:timing>
-    <p:tnLst>
-      <p:par>
-        <p:cTn id="1" dur="indefinite" restart="never" nodeType="tmRoot"/>
-      </p:par>
-    </p:tnLst>
-  </p:timing>
 </p:sld>
 </file>
 
@@ -11334,10 +11084,9 @@
           <a:lstStyle/>
           <a:p>
             <a:r>
-              <a:rPr lang="en-US" dirty="0" smtClean="0"/>
+              <a:rPr lang="en-US" dirty="0"/>
               <a:t>Service termination</a:t>
             </a:r>
-            <a:endParaRPr lang="en-US" dirty="0"/>
           </a:p>
         </p:txBody>
       </p:sp>
@@ -11351,13 +11100,6 @@
   <p:clrMapOvr>
     <a:masterClrMapping/>
   </p:clrMapOvr>
-  <p:timing>
-    <p:tnLst>
-      <p:par>
-        <p:cTn id="1" dur="indefinite" restart="never" nodeType="tmRoot"/>
-      </p:par>
-    </p:tnLst>
-  </p:timing>
 </p:sld>
 </file>
 
@@ -11399,10 +11141,9 @@
               </a:spcBef>
             </a:pPr>
             <a:r>
-              <a:rPr lang="en-GB" smtClean="0"/>
+              <a:rPr lang="en-GB"/>
               <a:t>C4: On-the-fly Compute Center II</a:t>
             </a:r>
-            <a:endParaRPr lang="en-GB"/>
           </a:p>
         </p:txBody>
       </p:sp>
@@ -11416,13 +11157,6 @@
   <p:clrMapOvr>
     <a:masterClrMapping/>
   </p:clrMapOvr>
-  <p:timing>
-    <p:tnLst>
-      <p:par>
-        <p:cTn id="1" dur="indefinite" restart="never" nodeType="tmRoot"/>
-      </p:par>
-    </p:tnLst>
-  </p:timing>
 </p:sld>
 </file>
 

</xml_diff>